<commit_message>
docs: refatoramento completo das documentações (#55)
</commit_message>
<xml_diff>
--- a/docs/ppt/terraglue-visual-identity.pptx
+++ b/docs/ppt/terraglue-visual-identity.pptx
@@ -134,6 +134,9 @@
         </p14:section>
       </p14:sectionLst>
     </p:ext>
+    <p:ext uri="{EFAFB233-063F-42B5-8137-9DF3F51BA10A}">
+      <p15:sldGuideLst xmlns:p15="http://schemas.microsoft.com/office/powerpoint/2012/main"/>
+    </p:ext>
   </p:extLst>
 </p:presentation>
 </file>
@@ -141,7 +144,7 @@
 <file path=ppt/revisionInfo.xml><?xml version="1.0" encoding="utf-8"?>
 <p1510:revInfo xmlns:a="http://schemas.openxmlformats.org/drawingml/2006/main" xmlns:r="http://schemas.openxmlformats.org/officeDocument/2006/relationships" xmlns:p1510="http://schemas.microsoft.com/office/powerpoint/2015/10/main">
   <p1510:revLst>
-    <p1510:client id="{EED3D3E7-5518-44F8-8186-31A285105760}" v="87" dt="2023-02-03T00:47:09.255"/>
+    <p1510:client id="{EED3D3E7-5518-44F8-8186-31A285105760}" v="128" dt="2023-02-03T01:07:15.186"/>
   </p1510:revLst>
 </p1510:revInfo>
 </file>
@@ -151,7 +154,7 @@
   <pc:docChgLst>
     <pc:chgData name="Thiago Henrique Gomes Panini" userId="cc6a5c77081c362d" providerId="LiveId" clId="{EED3D3E7-5518-44F8-8186-31A285105760}"/>
     <pc:docChg chg="undo custSel addSld delSld modSld sldOrd addSection modSection">
-      <pc:chgData name="Thiago Henrique Gomes Panini" userId="cc6a5c77081c362d" providerId="LiveId" clId="{EED3D3E7-5518-44F8-8186-31A285105760}" dt="2023-02-03T00:47:09.255" v="631" actId="164"/>
+      <pc:chgData name="Thiago Henrique Gomes Panini" userId="cc6a5c77081c362d" providerId="LiveId" clId="{EED3D3E7-5518-44F8-8186-31A285105760}" dt="2023-02-03T01:07:15.186" v="722" actId="478"/>
       <pc:docMkLst>
         <pc:docMk/>
       </pc:docMkLst>
@@ -3853,7 +3856,7 @@
         </pc:cxnChg>
       </pc:sldChg>
       <pc:sldChg chg="addSp delSp modSp add mod ord">
-        <pc:chgData name="Thiago Henrique Gomes Panini" userId="cc6a5c77081c362d" providerId="LiveId" clId="{EED3D3E7-5518-44F8-8186-31A285105760}" dt="2023-02-03T00:47:09.255" v="631" actId="164"/>
+        <pc:chgData name="Thiago Henrique Gomes Panini" userId="cc6a5c77081c362d" providerId="LiveId" clId="{EED3D3E7-5518-44F8-8186-31A285105760}" dt="2023-02-03T01:07:15.186" v="722" actId="478"/>
         <pc:sldMkLst>
           <pc:docMk/>
           <pc:sldMk cId="241076146" sldId="267"/>
@@ -3872,6 +3875,14 @@
             <pc:docMk/>
             <pc:sldMk cId="241076146" sldId="267"/>
             <ac:spMk id="5" creationId="{95FC706B-9D48-5AEA-AA8B-2541E9A76E05}"/>
+          </ac:spMkLst>
+        </pc:spChg>
+        <pc:spChg chg="add mod">
+          <ac:chgData name="Thiago Henrique Gomes Panini" userId="cc6a5c77081c362d" providerId="LiveId" clId="{EED3D3E7-5518-44F8-8186-31A285105760}" dt="2023-02-03T01:06:32.714" v="714"/>
+          <ac:spMkLst>
+            <pc:docMk/>
+            <pc:sldMk cId="241076146" sldId="267"/>
+            <ac:spMk id="5" creationId="{C6A01FD5-84E5-2381-286B-F32C449D0633}"/>
           </ac:spMkLst>
         </pc:spChg>
         <pc:spChg chg="mod">
@@ -4866,12 +4877,60 @@
             <ac:grpSpMk id="137" creationId="{38FBAED1-C2CD-E6B2-D9B7-496E44DD9A8A}"/>
           </ac:grpSpMkLst>
         </pc:grpChg>
+        <pc:picChg chg="add mod">
+          <ac:chgData name="Thiago Henrique Gomes Panini" userId="cc6a5c77081c362d" providerId="LiveId" clId="{EED3D3E7-5518-44F8-8186-31A285105760}" dt="2023-02-03T00:55:53.383" v="641" actId="1076"/>
+          <ac:picMkLst>
+            <pc:docMk/>
+            <pc:sldMk cId="241076146" sldId="267"/>
+            <ac:picMk id="2" creationId="{58B29FF3-C52F-448F-CE21-E6A83B41279C}"/>
+          </ac:picMkLst>
+        </pc:picChg>
         <pc:picChg chg="mod modCrop">
           <ac:chgData name="Thiago Henrique Gomes Panini" userId="cc6a5c77081c362d" providerId="LiveId" clId="{EED3D3E7-5518-44F8-8186-31A285105760}" dt="2023-02-03T00:47:09.255" v="631" actId="164"/>
           <ac:picMkLst>
             <pc:docMk/>
             <pc:sldMk cId="241076146" sldId="267"/>
             <ac:picMk id="3" creationId="{85DA4F43-CB0A-334B-9C23-313F0BFAD35A}"/>
+          </ac:picMkLst>
+        </pc:picChg>
+        <pc:picChg chg="add mod ord">
+          <ac:chgData name="Thiago Henrique Gomes Panini" userId="cc6a5c77081c362d" providerId="LiveId" clId="{EED3D3E7-5518-44F8-8186-31A285105760}" dt="2023-02-03T00:56:22.710" v="662" actId="166"/>
+          <ac:picMkLst>
+            <pc:docMk/>
+            <pc:sldMk cId="241076146" sldId="267"/>
+            <ac:picMk id="4" creationId="{A0F5EB9D-2934-15D3-786E-E68DA9F084B0}"/>
+          </ac:picMkLst>
+        </pc:picChg>
+        <pc:picChg chg="add del mod">
+          <ac:chgData name="Thiago Henrique Gomes Panini" userId="cc6a5c77081c362d" providerId="LiveId" clId="{EED3D3E7-5518-44F8-8186-31A285105760}" dt="2023-02-03T01:07:15.186" v="722" actId="478"/>
+          <ac:picMkLst>
+            <pc:docMk/>
+            <pc:sldMk cId="241076146" sldId="267"/>
+            <ac:picMk id="6" creationId="{8B14094E-32FC-561B-E2A8-F38219033A33}"/>
+          </ac:picMkLst>
+        </pc:picChg>
+        <pc:picChg chg="add del mod">
+          <ac:chgData name="Thiago Henrique Gomes Panini" userId="cc6a5c77081c362d" providerId="LiveId" clId="{EED3D3E7-5518-44F8-8186-31A285105760}" dt="2023-02-03T01:07:15.186" v="722" actId="478"/>
+          <ac:picMkLst>
+            <pc:docMk/>
+            <pc:sldMk cId="241076146" sldId="267"/>
+            <ac:picMk id="7" creationId="{96A29BDB-A43D-02A2-A016-17FC87D0EF55}"/>
+          </ac:picMkLst>
+        </pc:picChg>
+        <pc:picChg chg="add del mod">
+          <ac:chgData name="Thiago Henrique Gomes Panini" userId="cc6a5c77081c362d" providerId="LiveId" clId="{EED3D3E7-5518-44F8-8186-31A285105760}" dt="2023-02-03T01:07:15.186" v="722" actId="478"/>
+          <ac:picMkLst>
+            <pc:docMk/>
+            <pc:sldMk cId="241076146" sldId="267"/>
+            <ac:picMk id="8" creationId="{2F91C948-E26B-4E14-0B00-318B630E8945}"/>
+          </ac:picMkLst>
+        </pc:picChg>
+        <pc:picChg chg="add del mod">
+          <ac:chgData name="Thiago Henrique Gomes Panini" userId="cc6a5c77081c362d" providerId="LiveId" clId="{EED3D3E7-5518-44F8-8186-31A285105760}" dt="2023-02-03T01:07:13.249" v="721" actId="478"/>
+          <ac:picMkLst>
+            <pc:docMk/>
+            <pc:sldMk cId="241076146" sldId="267"/>
+            <ac:picMk id="9" creationId="{18F2E132-FEBF-ECA1-0CAE-3D7F5236819E}"/>
           </ac:picMkLst>
         </pc:picChg>
         <pc:picChg chg="mod">
@@ -4891,7 +4950,7 @@
           </ac:picMkLst>
         </pc:picChg>
         <pc:picChg chg="add mod">
-          <ac:chgData name="Thiago Henrique Gomes Panini" userId="cc6a5c77081c362d" providerId="LiveId" clId="{EED3D3E7-5518-44F8-8186-31A285105760}" dt="2023-02-03T00:47:09.255" v="631" actId="164"/>
+          <ac:chgData name="Thiago Henrique Gomes Panini" userId="cc6a5c77081c362d" providerId="LiveId" clId="{EED3D3E7-5518-44F8-8186-31A285105760}" dt="2023-02-03T00:57:59.484" v="686" actId="1036"/>
           <ac:picMkLst>
             <pc:docMk/>
             <pc:sldMk cId="241076146" sldId="267"/>
@@ -4914,8 +4973,8 @@
             <ac:picMk id="91" creationId="{E4F50630-D6E0-EB68-3D99-F71C32EBB514}"/>
           </ac:picMkLst>
         </pc:picChg>
-        <pc:picChg chg="add mod ord modCrop">
-          <ac:chgData name="Thiago Henrique Gomes Panini" userId="cc6a5c77081c362d" providerId="LiveId" clId="{EED3D3E7-5518-44F8-8186-31A285105760}" dt="2023-02-03T00:44:39.104" v="619" actId="732"/>
+        <pc:picChg chg="add del mod ord modCrop">
+          <ac:chgData name="Thiago Henrique Gomes Panini" userId="cc6a5c77081c362d" providerId="LiveId" clId="{EED3D3E7-5518-44F8-8186-31A285105760}" dt="2023-02-03T00:55:39.341" v="636" actId="21"/>
           <ac:picMkLst>
             <pc:docMk/>
             <pc:sldMk cId="241076146" sldId="267"/>
@@ -4938,23 +4997,47 @@
             <ac:picMk id="120" creationId="{FB289655-1C57-C8D4-42EA-510561EDF028}"/>
           </ac:picMkLst>
         </pc:picChg>
-        <pc:picChg chg="add mod">
-          <ac:chgData name="Thiago Henrique Gomes Panini" userId="cc6a5c77081c362d" providerId="LiveId" clId="{EED3D3E7-5518-44F8-8186-31A285105760}" dt="2023-02-03T00:44:43.197" v="620" actId="1076"/>
+        <pc:picChg chg="add del mod">
+          <ac:chgData name="Thiago Henrique Gomes Panini" userId="cc6a5c77081c362d" providerId="LiveId" clId="{EED3D3E7-5518-44F8-8186-31A285105760}" dt="2023-02-03T00:55:39.341" v="636" actId="21"/>
           <ac:picMkLst>
             <pc:docMk/>
             <pc:sldMk cId="241076146" sldId="267"/>
             <ac:picMk id="136" creationId="{905840FE-E8E9-BBEC-CFDA-3C4831A8E17E}"/>
           </ac:picMkLst>
         </pc:picChg>
+        <pc:picChg chg="add del mod">
+          <ac:chgData name="Thiago Henrique Gomes Panini" userId="cc6a5c77081c362d" providerId="LiveId" clId="{EED3D3E7-5518-44F8-8186-31A285105760}" dt="2023-02-03T01:06:39.028" v="716" actId="478"/>
+          <ac:picMkLst>
+            <pc:docMk/>
+            <pc:sldMk cId="241076146" sldId="267"/>
+            <ac:picMk id="1026" creationId="{51CCC149-2C7E-6752-0FA7-9190E49C83E2}"/>
+          </ac:picMkLst>
+        </pc:picChg>
+        <pc:picChg chg="add del mod">
+          <ac:chgData name="Thiago Henrique Gomes Panini" userId="cc6a5c77081c362d" providerId="LiveId" clId="{EED3D3E7-5518-44F8-8186-31A285105760}" dt="2023-02-03T01:06:51.286" v="718"/>
+          <ac:picMkLst>
+            <pc:docMk/>
+            <pc:sldMk cId="241076146" sldId="267"/>
+            <ac:picMk id="1028" creationId="{F6D909A3-F34C-75FF-E6FD-E3F0FD52D978}"/>
+          </ac:picMkLst>
+        </pc:picChg>
+        <pc:picChg chg="add del mod">
+          <ac:chgData name="Thiago Henrique Gomes Panini" userId="cc6a5c77081c362d" providerId="LiveId" clId="{EED3D3E7-5518-44F8-8186-31A285105760}" dt="2023-02-03T01:06:58.651" v="720"/>
+          <ac:picMkLst>
+            <pc:docMk/>
+            <pc:sldMk cId="241076146" sldId="267"/>
+            <ac:picMk id="1030" creationId="{A74DB368-B057-086D-2E5E-A3AFEEE2E86F}"/>
+          </ac:picMkLst>
+        </pc:picChg>
       </pc:sldChg>
       <pc:sldChg chg="addSp delSp modSp add mod">
-        <pc:chgData name="Thiago Henrique Gomes Panini" userId="cc6a5c77081c362d" providerId="LiveId" clId="{EED3D3E7-5518-44F8-8186-31A285105760}" dt="2023-02-03T00:45:40.195" v="630" actId="478"/>
+        <pc:chgData name="Thiago Henrique Gomes Panini" userId="cc6a5c77081c362d" providerId="LiveId" clId="{EED3D3E7-5518-44F8-8186-31A285105760}" dt="2023-02-03T00:57:42.310" v="681" actId="732"/>
         <pc:sldMkLst>
           <pc:docMk/>
           <pc:sldMk cId="2282606015" sldId="268"/>
         </pc:sldMkLst>
-        <pc:picChg chg="add mod modCrop">
-          <ac:chgData name="Thiago Henrique Gomes Panini" userId="cc6a5c77081c362d" providerId="LiveId" clId="{EED3D3E7-5518-44F8-8186-31A285105760}" dt="2023-02-03T00:45:24.265" v="627" actId="1076"/>
+        <pc:picChg chg="add del mod modCrop">
+          <ac:chgData name="Thiago Henrique Gomes Panini" userId="cc6a5c77081c362d" providerId="LiveId" clId="{EED3D3E7-5518-44F8-8186-31A285105760}" dt="2023-02-03T00:55:42.133" v="637" actId="478"/>
           <ac:picMkLst>
             <pc:docMk/>
             <pc:sldMk cId="2282606015" sldId="268"/>
@@ -4970,11 +5053,43 @@
           </ac:picMkLst>
         </pc:picChg>
         <pc:picChg chg="add mod">
-          <ac:chgData name="Thiago Henrique Gomes Panini" userId="cc6a5c77081c362d" providerId="LiveId" clId="{EED3D3E7-5518-44F8-8186-31A285105760}" dt="2023-02-03T00:45:32.060" v="629" actId="1076"/>
+          <ac:chgData name="Thiago Henrique Gomes Panini" userId="cc6a5c77081c362d" providerId="LiveId" clId="{EED3D3E7-5518-44F8-8186-31A285105760}" dt="2023-02-03T00:56:47.652" v="669" actId="1076"/>
+          <ac:picMkLst>
+            <pc:docMk/>
+            <pc:sldMk cId="2282606015" sldId="268"/>
+            <ac:picMk id="3" creationId="{91E8EFA6-FE14-7B86-732E-6ACB805062A4}"/>
+          </ac:picMkLst>
+        </pc:picChg>
+        <pc:picChg chg="add del mod">
+          <ac:chgData name="Thiago Henrique Gomes Panini" userId="cc6a5c77081c362d" providerId="LiveId" clId="{EED3D3E7-5518-44F8-8186-31A285105760}" dt="2023-02-03T00:55:42.133" v="637" actId="478"/>
           <ac:picMkLst>
             <pc:docMk/>
             <pc:sldMk cId="2282606015" sldId="268"/>
             <ac:picMk id="4" creationId="{0DE66E8B-49AC-22E5-1CEF-02D5623C2527}"/>
+          </ac:picMkLst>
+        </pc:picChg>
+        <pc:picChg chg="add mod">
+          <ac:chgData name="Thiago Henrique Gomes Panini" userId="cc6a5c77081c362d" providerId="LiveId" clId="{EED3D3E7-5518-44F8-8186-31A285105760}" dt="2023-02-03T00:56:47.652" v="669" actId="1076"/>
+          <ac:picMkLst>
+            <pc:docMk/>
+            <pc:sldMk cId="2282606015" sldId="268"/>
+            <ac:picMk id="5" creationId="{782894F6-1C53-568B-A715-D4C5986D1AC5}"/>
+          </ac:picMkLst>
+        </pc:picChg>
+        <pc:picChg chg="add mod modCrop">
+          <ac:chgData name="Thiago Henrique Gomes Panini" userId="cc6a5c77081c362d" providerId="LiveId" clId="{EED3D3E7-5518-44F8-8186-31A285105760}" dt="2023-02-03T00:57:42.310" v="681" actId="732"/>
+          <ac:picMkLst>
+            <pc:docMk/>
+            <pc:sldMk cId="2282606015" sldId="268"/>
+            <ac:picMk id="6" creationId="{3E68B4EA-D8D6-E900-54D5-A2A9D6B812EC}"/>
+          </ac:picMkLst>
+        </pc:picChg>
+        <pc:picChg chg="add mod">
+          <ac:chgData name="Thiago Henrique Gomes Panini" userId="cc6a5c77081c362d" providerId="LiveId" clId="{EED3D3E7-5518-44F8-8186-31A285105760}" dt="2023-02-03T00:57:20.597" v="676" actId="1076"/>
+          <ac:picMkLst>
+            <pc:docMk/>
+            <pc:sldMk cId="2282606015" sldId="268"/>
+            <ac:picMk id="7" creationId="{159D4282-C4FD-D011-1828-7132238D7FE2}"/>
           </ac:picMkLst>
         </pc:picChg>
         <pc:picChg chg="del">
@@ -25596,41 +25711,6 @@
           <a:chExt cx="0" cy="0"/>
         </a:xfrm>
       </p:grpSpPr>
-      <p:pic>
-        <p:nvPicPr>
-          <p:cNvPr id="92" name="Picture 91" descr="A picture containing nature, night sky&#10;&#10;Description automatically generated">
-            <a:extLst>
-              <a:ext uri="{FF2B5EF4-FFF2-40B4-BE49-F238E27FC236}">
-                <a16:creationId xmlns:a16="http://schemas.microsoft.com/office/drawing/2014/main" id="{285E440B-A34F-380A-7990-63130422AC26}"/>
-              </a:ext>
-            </a:extLst>
-          </p:cNvPr>
-          <p:cNvPicPr>
-            <a:picLocks noChangeAspect="1"/>
-          </p:cNvPicPr>
-          <p:nvPr/>
-        </p:nvPicPr>
-        <p:blipFill rotWithShape="1">
-          <a:blip r:embed="rId2">
-            <a:extLst>
-              <a:ext uri="{28A0092B-C50C-407E-A947-70E740481C1C}">
-                <a14:useLocalDpi xmlns:a14="http://schemas.microsoft.com/office/drawing/2010/main" val="0"/>
-              </a:ext>
-            </a:extLst>
-          </a:blip>
-          <a:srcRect t="36852" b="23333"/>
-          <a:stretch/>
-        </p:blipFill>
-        <p:spPr>
-          <a:xfrm>
-            <a:off x="0" y="3860800"/>
-            <a:ext cx="12192000" cy="2730500"/>
-          </a:xfrm>
-          <a:prstGeom prst="rect">
-            <a:avLst/>
-          </a:prstGeom>
-        </p:spPr>
-      </p:pic>
       <p:grpSp>
         <p:nvGrpSpPr>
           <p:cNvPr id="137" name="Group 136">
@@ -25666,7 +25746,7 @@
             <p:nvPr/>
           </p:nvPicPr>
           <p:blipFill rotWithShape="1">
-            <a:blip r:embed="rId3">
+            <a:blip r:embed="rId2">
               <a:extLst>
                 <a:ext uri="{28A0092B-C50C-407E-A947-70E740481C1C}">
                   <a14:useLocalDpi xmlns:a14="http://schemas.microsoft.com/office/drawing/2010/main" val="0"/>
@@ -25701,14 +25781,14 @@
             <p:nvPr/>
           </p:nvPicPr>
           <p:blipFill>
-            <a:blip r:embed="rId4"/>
+            <a:blip r:embed="rId3"/>
             <a:stretch>
               <a:fillRect/>
             </a:stretch>
           </p:blipFill>
           <p:spPr>
             <a:xfrm>
-              <a:off x="5121679" y="787448"/>
+              <a:off x="5121679" y="850948"/>
               <a:ext cx="1948642" cy="2489104"/>
             </a:xfrm>
             <a:prstGeom prst="rect">
@@ -25719,10 +25799,99 @@
       </p:grpSp>
       <p:pic>
         <p:nvPicPr>
-          <p:cNvPr id="136" name="Picture 135">
+          <p:cNvPr id="2" name="Picture 1" descr="A picture containing nature, water, night sky, outdoor&#10;&#10;Description automatically generated">
             <a:extLst>
               <a:ext uri="{FF2B5EF4-FFF2-40B4-BE49-F238E27FC236}">
-                <a16:creationId xmlns:a16="http://schemas.microsoft.com/office/drawing/2014/main" id="{905840FE-E8E9-BBEC-CFDA-3C4831A8E17E}"/>
+                <a16:creationId xmlns:a16="http://schemas.microsoft.com/office/drawing/2014/main" id="{58B29FF3-C52F-448F-CE21-E6A83B41279C}"/>
+              </a:ext>
+            </a:extLst>
+          </p:cNvPr>
+          <p:cNvPicPr>
+            <a:picLocks noChangeAspect="1"/>
+          </p:cNvPicPr>
+          <p:nvPr/>
+        </p:nvPicPr>
+        <p:blipFill rotWithShape="1">
+          <a:blip r:embed="rId4">
+            <a:extLst>
+              <a:ext uri="{28A0092B-C50C-407E-A947-70E740481C1C}">
+                <a14:useLocalDpi xmlns:a14="http://schemas.microsoft.com/office/drawing/2010/main" val="0"/>
+              </a:ext>
+            </a:extLst>
+          </a:blip>
+          <a:srcRect t="47596" b="37393"/>
+          <a:stretch/>
+        </p:blipFill>
+        <p:spPr>
+          <a:xfrm>
+            <a:off x="0" y="3746548"/>
+            <a:ext cx="12192000" cy="2895600"/>
+          </a:xfrm>
+          <a:prstGeom prst="rect">
+            <a:avLst/>
+          </a:prstGeom>
+        </p:spPr>
+      </p:pic>
+      <p:sp>
+        <p:nvSpPr>
+          <p:cNvPr id="5" name="Rectangle 4">
+            <a:extLst>
+              <a:ext uri="{FF2B5EF4-FFF2-40B4-BE49-F238E27FC236}">
+                <a16:creationId xmlns:a16="http://schemas.microsoft.com/office/drawing/2014/main" id="{C6A01FD5-84E5-2381-286B-F32C449D0633}"/>
+              </a:ext>
+            </a:extLst>
+          </p:cNvPr>
+          <p:cNvSpPr/>
+          <p:nvPr/>
+        </p:nvSpPr>
+        <p:spPr>
+          <a:xfrm>
+            <a:off x="0" y="3746548"/>
+            <a:ext cx="12192000" cy="2895600"/>
+          </a:xfrm>
+          <a:prstGeom prst="rect">
+            <a:avLst/>
+          </a:prstGeom>
+          <a:solidFill>
+            <a:srgbClr val="10002B">
+              <a:alpha val="68000"/>
+            </a:srgbClr>
+          </a:solidFill>
+          <a:ln>
+            <a:noFill/>
+          </a:ln>
+        </p:spPr>
+        <p:style>
+          <a:lnRef idx="2">
+            <a:schemeClr val="accent1">
+              <a:shade val="50000"/>
+            </a:schemeClr>
+          </a:lnRef>
+          <a:fillRef idx="1">
+            <a:schemeClr val="accent1"/>
+          </a:fillRef>
+          <a:effectRef idx="0">
+            <a:schemeClr val="accent1"/>
+          </a:effectRef>
+          <a:fontRef idx="minor">
+            <a:schemeClr val="lt1"/>
+          </a:fontRef>
+        </p:style>
+        <p:txBody>
+          <a:bodyPr rtlCol="0" anchor="ctr"/>
+          <a:lstStyle/>
+          <a:p>
+            <a:pPr algn="ctr"/>
+            <a:endParaRPr lang="en-US" dirty="0"/>
+          </a:p>
+        </p:txBody>
+      </p:sp>
+      <p:pic>
+        <p:nvPicPr>
+          <p:cNvPr id="4" name="Picture 3">
+            <a:extLst>
+              <a:ext uri="{FF2B5EF4-FFF2-40B4-BE49-F238E27FC236}">
+                <a16:creationId xmlns:a16="http://schemas.microsoft.com/office/drawing/2014/main" id="{A0F5EB9D-2934-15D3-786E-E68DA9F084B0}"/>
               </a:ext>
             </a:extLst>
           </p:cNvPr>
@@ -25739,7 +25908,7 @@
         </p:blipFill>
         <p:spPr>
           <a:xfrm>
-            <a:off x="5244058" y="4059658"/>
+            <a:off x="5096604" y="4149085"/>
             <a:ext cx="1826263" cy="2332784"/>
           </a:xfrm>
           <a:prstGeom prst="rect">
@@ -25779,10 +25948,10 @@
       </p:grpSpPr>
       <p:pic>
         <p:nvPicPr>
-          <p:cNvPr id="2" name="Picture 1" descr="A picture containing nature, water, night sky, outdoor&#10;&#10;Description automatically generated">
+          <p:cNvPr id="3" name="Picture 2" descr="A picture containing nature, night sky&#10;&#10;Description automatically generated">
             <a:extLst>
               <a:ext uri="{FF2B5EF4-FFF2-40B4-BE49-F238E27FC236}">
-                <a16:creationId xmlns:a16="http://schemas.microsoft.com/office/drawing/2014/main" id="{2DEDEB0D-55B0-F2D6-BA5E-E14032365C6E}"/>
+                <a16:creationId xmlns:a16="http://schemas.microsoft.com/office/drawing/2014/main" id="{91E8EFA6-FE14-7B86-732E-6ACB805062A4}"/>
               </a:ext>
             </a:extLst>
           </p:cNvPr>
@@ -25799,13 +25968,13 @@
               </a:ext>
             </a:extLst>
           </a:blip>
-          <a:srcRect t="47596" b="37393"/>
+          <a:srcRect t="36852" b="23333"/>
           <a:stretch/>
         </p:blipFill>
         <p:spPr>
           <a:xfrm>
-            <a:off x="0" y="266700"/>
-            <a:ext cx="12348202" cy="2895600"/>
+            <a:off x="0" y="3554845"/>
+            <a:ext cx="12192000" cy="2730500"/>
           </a:xfrm>
           <a:prstGeom prst="rect">
             <a:avLst/>
@@ -25814,10 +25983,10 @@
       </p:pic>
       <p:pic>
         <p:nvPicPr>
-          <p:cNvPr id="4" name="Picture 3">
+          <p:cNvPr id="5" name="Picture 4">
             <a:extLst>
               <a:ext uri="{FF2B5EF4-FFF2-40B4-BE49-F238E27FC236}">
-                <a16:creationId xmlns:a16="http://schemas.microsoft.com/office/drawing/2014/main" id="{0DE66E8B-49AC-22E5-1CEF-02D5623C2527}"/>
+                <a16:creationId xmlns:a16="http://schemas.microsoft.com/office/drawing/2014/main" id="{782894F6-1C53-568B-A715-D4C5986D1AC5}"/>
               </a:ext>
             </a:extLst>
           </p:cNvPr>
@@ -25834,8 +26003,73 @@
         </p:blipFill>
         <p:spPr>
           <a:xfrm>
-            <a:off x="5182868" y="643358"/>
+            <a:off x="5244058" y="3753703"/>
             <a:ext cx="1826263" cy="2332784"/>
+          </a:xfrm>
+          <a:prstGeom prst="rect">
+            <a:avLst/>
+          </a:prstGeom>
+        </p:spPr>
+      </p:pic>
+      <p:pic>
+        <p:nvPicPr>
+          <p:cNvPr id="6" name="Picture 5" descr="A body of water with mountains in the background&#10;&#10;Description automatically generated with medium confidence">
+            <a:extLst>
+              <a:ext uri="{FF2B5EF4-FFF2-40B4-BE49-F238E27FC236}">
+                <a16:creationId xmlns:a16="http://schemas.microsoft.com/office/drawing/2014/main" id="{3E68B4EA-D8D6-E900-54D5-A2A9D6B812EC}"/>
+              </a:ext>
+            </a:extLst>
+          </p:cNvPr>
+          <p:cNvPicPr>
+            <a:picLocks noChangeAspect="1"/>
+          </p:cNvPicPr>
+          <p:nvPr/>
+        </p:nvPicPr>
+        <p:blipFill rotWithShape="1">
+          <a:blip r:embed="rId4">
+            <a:extLst>
+              <a:ext uri="{28A0092B-C50C-407E-A947-70E740481C1C}">
+                <a14:useLocalDpi xmlns:a14="http://schemas.microsoft.com/office/drawing/2010/main" val="0"/>
+              </a:ext>
+            </a:extLst>
+          </a:blip>
+          <a:srcRect t="30317" b="35032"/>
+          <a:stretch/>
+        </p:blipFill>
+        <p:spPr>
+          <a:xfrm>
+            <a:off x="1" y="444500"/>
+            <a:ext cx="12191999" cy="2816117"/>
+          </a:xfrm>
+          <a:prstGeom prst="rect">
+            <a:avLst/>
+          </a:prstGeom>
+        </p:spPr>
+      </p:pic>
+      <p:pic>
+        <p:nvPicPr>
+          <p:cNvPr id="7" name="Picture 6">
+            <a:extLst>
+              <a:ext uri="{FF2B5EF4-FFF2-40B4-BE49-F238E27FC236}">
+                <a16:creationId xmlns:a16="http://schemas.microsoft.com/office/drawing/2014/main" id="{159D4282-C4FD-D011-1828-7132238D7FE2}"/>
+              </a:ext>
+            </a:extLst>
+          </p:cNvPr>
+          <p:cNvPicPr>
+            <a:picLocks noChangeAspect="1"/>
+          </p:cNvPicPr>
+          <p:nvPr/>
+        </p:nvPicPr>
+        <p:blipFill>
+          <a:blip r:embed="rId5"/>
+          <a:stretch>
+            <a:fillRect/>
+          </a:stretch>
+        </p:blipFill>
+        <p:spPr>
+          <a:xfrm>
+            <a:off x="5182868" y="771513"/>
+            <a:ext cx="1948642" cy="2489104"/>
           </a:xfrm>
           <a:prstGeom prst="rect">
             <a:avLst/>

</xml_diff>

<commit_message>
docs: refatorando todas as imagens da doc INFRA.md (#55)
</commit_message>
<xml_diff>
--- a/docs/ppt/terraglue-visual-identity.pptx
+++ b/docs/ppt/terraglue-visual-identity.pptx
@@ -10,8 +10,9 @@
     <p:sldId id="263" r:id="rId4"/>
     <p:sldId id="262" r:id="rId5"/>
     <p:sldId id="267" r:id="rId6"/>
-    <p:sldId id="268" r:id="rId7"/>
-    <p:sldId id="266" r:id="rId8"/>
+    <p:sldId id="269" r:id="rId7"/>
+    <p:sldId id="268" r:id="rId8"/>
+    <p:sldId id="266" r:id="rId9"/>
   </p:sldIdLst>
   <p:sldSz cx="12192000" cy="6858000"/>
   <p:notesSz cx="6858000" cy="9144000"/>
@@ -124,6 +125,7 @@
         <p14:section name="github-header" id="{2299AE42-6A03-44B5-88DC-23F31134BD38}">
           <p14:sldIdLst>
             <p14:sldId id="267"/>
+            <p14:sldId id="269"/>
             <p14:sldId id="268"/>
           </p14:sldIdLst>
         </p14:section>
@@ -144,7 +146,7 @@
 <file path=ppt/revisionInfo.xml><?xml version="1.0" encoding="utf-8"?>
 <p1510:revInfo xmlns:a="http://schemas.openxmlformats.org/drawingml/2006/main" xmlns:r="http://schemas.openxmlformats.org/officeDocument/2006/relationships" xmlns:p1510="http://schemas.microsoft.com/office/powerpoint/2015/10/main">
   <p1510:revLst>
-    <p1510:client id="{EED3D3E7-5518-44F8-8186-31A285105760}" v="128" dt="2023-02-03T01:07:15.186"/>
+    <p1510:client id="{EED3D3E7-5518-44F8-8186-31A285105760}" v="141" dt="2023-02-03T21:42:18.405"/>
   </p1510:revLst>
 </p1510:revInfo>
 </file>
@@ -154,7 +156,7 @@
   <pc:docChgLst>
     <pc:chgData name="Thiago Henrique Gomes Panini" userId="cc6a5c77081c362d" providerId="LiveId" clId="{EED3D3E7-5518-44F8-8186-31A285105760}"/>
     <pc:docChg chg="undo custSel addSld delSld modSld sldOrd addSection modSection">
-      <pc:chgData name="Thiago Henrique Gomes Panini" userId="cc6a5c77081c362d" providerId="LiveId" clId="{EED3D3E7-5518-44F8-8186-31A285105760}" dt="2023-02-03T01:07:15.186" v="722" actId="478"/>
+      <pc:chgData name="Thiago Henrique Gomes Panini" userId="cc6a5c77081c362d" providerId="LiveId" clId="{EED3D3E7-5518-44F8-8186-31A285105760}" dt="2023-02-03T21:56:53.355" v="894" actId="14100"/>
       <pc:docMkLst>
         <pc:docMk/>
       </pc:docMkLst>
@@ -5114,6 +5116,749 @@
             <pc:docMk/>
             <pc:sldMk cId="2282606015" sldId="268"/>
             <ac:picMk id="136" creationId="{905840FE-E8E9-BBEC-CFDA-3C4831A8E17E}"/>
+          </ac:picMkLst>
+        </pc:picChg>
+      </pc:sldChg>
+      <pc:sldChg chg="addSp delSp modSp add mod">
+        <pc:chgData name="Thiago Henrique Gomes Panini" userId="cc6a5c77081c362d" providerId="LiveId" clId="{EED3D3E7-5518-44F8-8186-31A285105760}" dt="2023-02-03T21:56:53.355" v="894" actId="14100"/>
+        <pc:sldMkLst>
+          <pc:docMk/>
+          <pc:sldMk cId="2654742094" sldId="269"/>
+        </pc:sldMkLst>
+        <pc:spChg chg="mod">
+          <ac:chgData name="Thiago Henrique Gomes Panini" userId="cc6a5c77081c362d" providerId="LiveId" clId="{EED3D3E7-5518-44F8-8186-31A285105760}" dt="2023-02-03T21:56:53.355" v="894" actId="14100"/>
+          <ac:spMkLst>
+            <pc:docMk/>
+            <pc:sldMk cId="2654742094" sldId="269"/>
+            <ac:spMk id="5" creationId="{C6A01FD5-84E5-2381-286B-F32C449D0633}"/>
+          </ac:spMkLst>
+        </pc:spChg>
+        <pc:spChg chg="add del mod">
+          <ac:chgData name="Thiago Henrique Gomes Panini" userId="cc6a5c77081c362d" providerId="LiveId" clId="{EED3D3E7-5518-44F8-8186-31A285105760}" dt="2023-02-03T21:40:16.975" v="787"/>
+          <ac:spMkLst>
+            <pc:docMk/>
+            <pc:sldMk cId="2654742094" sldId="269"/>
+            <ac:spMk id="6" creationId="{19D51672-34DF-C236-B891-3910CAE86E84}"/>
+          </ac:spMkLst>
+        </pc:spChg>
+        <pc:spChg chg="add del mod">
+          <ac:chgData name="Thiago Henrique Gomes Panini" userId="cc6a5c77081c362d" providerId="LiveId" clId="{EED3D3E7-5518-44F8-8186-31A285105760}" dt="2023-02-03T21:40:16.975" v="787"/>
+          <ac:spMkLst>
+            <pc:docMk/>
+            <pc:sldMk cId="2654742094" sldId="269"/>
+            <ac:spMk id="7" creationId="{445C0361-40EA-7BD1-534F-AA2E55897885}"/>
+          </ac:spMkLst>
+        </pc:spChg>
+        <pc:spChg chg="mod">
+          <ac:chgData name="Thiago Henrique Gomes Panini" userId="cc6a5c77081c362d" providerId="LiveId" clId="{EED3D3E7-5518-44F8-8186-31A285105760}" dt="2023-02-03T21:40:37.243" v="790" actId="1076"/>
+          <ac:spMkLst>
+            <pc:docMk/>
+            <pc:sldMk cId="2654742094" sldId="269"/>
+            <ac:spMk id="9" creationId="{3D3F3559-EC16-1215-2071-D6C02FC40904}"/>
+          </ac:spMkLst>
+        </pc:spChg>
+        <pc:spChg chg="del mod">
+          <ac:chgData name="Thiago Henrique Gomes Panini" userId="cc6a5c77081c362d" providerId="LiveId" clId="{EED3D3E7-5518-44F8-8186-31A285105760}" dt="2023-02-03T21:40:39.225" v="791" actId="478"/>
+          <ac:spMkLst>
+            <pc:docMk/>
+            <pc:sldMk cId="2654742094" sldId="269"/>
+            <ac:spMk id="10" creationId="{D85CA914-FE00-C848-9728-3FE89BF166F1}"/>
+          </ac:spMkLst>
+        </pc:spChg>
+        <pc:spChg chg="mod">
+          <ac:chgData name="Thiago Henrique Gomes Panini" userId="cc6a5c77081c362d" providerId="LiveId" clId="{EED3D3E7-5518-44F8-8186-31A285105760}" dt="2023-02-03T21:40:37.243" v="790" actId="1076"/>
+          <ac:spMkLst>
+            <pc:docMk/>
+            <pc:sldMk cId="2654742094" sldId="269"/>
+            <ac:spMk id="11" creationId="{7249ACB1-B47D-25F5-FBBA-4DFBCDA9E02A}"/>
+          </ac:spMkLst>
+        </pc:spChg>
+        <pc:spChg chg="mod">
+          <ac:chgData name="Thiago Henrique Gomes Panini" userId="cc6a5c77081c362d" providerId="LiveId" clId="{EED3D3E7-5518-44F8-8186-31A285105760}" dt="2023-02-03T21:40:37.243" v="790" actId="1076"/>
+          <ac:spMkLst>
+            <pc:docMk/>
+            <pc:sldMk cId="2654742094" sldId="269"/>
+            <ac:spMk id="12" creationId="{4A6C6EE1-112C-D636-6210-6C95CC304D35}"/>
+          </ac:spMkLst>
+        </pc:spChg>
+        <pc:spChg chg="mod">
+          <ac:chgData name="Thiago Henrique Gomes Panini" userId="cc6a5c77081c362d" providerId="LiveId" clId="{EED3D3E7-5518-44F8-8186-31A285105760}" dt="2023-02-03T21:40:37.243" v="790" actId="1076"/>
+          <ac:spMkLst>
+            <pc:docMk/>
+            <pc:sldMk cId="2654742094" sldId="269"/>
+            <ac:spMk id="13" creationId="{AD97D75E-FF65-9011-3778-A70A651AF99A}"/>
+          </ac:spMkLst>
+        </pc:spChg>
+        <pc:spChg chg="mod">
+          <ac:chgData name="Thiago Henrique Gomes Panini" userId="cc6a5c77081c362d" providerId="LiveId" clId="{EED3D3E7-5518-44F8-8186-31A285105760}" dt="2023-02-03T21:40:37.243" v="790" actId="1076"/>
+          <ac:spMkLst>
+            <pc:docMk/>
+            <pc:sldMk cId="2654742094" sldId="269"/>
+            <ac:spMk id="14" creationId="{57890730-DFE9-6591-4B7A-12A1475BDEB7}"/>
+          </ac:spMkLst>
+        </pc:spChg>
+        <pc:spChg chg="mod">
+          <ac:chgData name="Thiago Henrique Gomes Panini" userId="cc6a5c77081c362d" providerId="LiveId" clId="{EED3D3E7-5518-44F8-8186-31A285105760}" dt="2023-02-03T21:40:37.243" v="790" actId="1076"/>
+          <ac:spMkLst>
+            <pc:docMk/>
+            <pc:sldMk cId="2654742094" sldId="269"/>
+            <ac:spMk id="15" creationId="{65829624-28B1-C754-E17D-2E182C0EEB39}"/>
+          </ac:spMkLst>
+        </pc:spChg>
+        <pc:spChg chg="mod">
+          <ac:chgData name="Thiago Henrique Gomes Panini" userId="cc6a5c77081c362d" providerId="LiveId" clId="{EED3D3E7-5518-44F8-8186-31A285105760}" dt="2023-02-03T21:40:37.243" v="790" actId="1076"/>
+          <ac:spMkLst>
+            <pc:docMk/>
+            <pc:sldMk cId="2654742094" sldId="269"/>
+            <ac:spMk id="16" creationId="{6CD10F22-FC1B-18AE-D7C9-B219A090026D}"/>
+          </ac:spMkLst>
+        </pc:spChg>
+        <pc:spChg chg="mod">
+          <ac:chgData name="Thiago Henrique Gomes Panini" userId="cc6a5c77081c362d" providerId="LiveId" clId="{EED3D3E7-5518-44F8-8186-31A285105760}" dt="2023-02-03T21:40:37.243" v="790" actId="1076"/>
+          <ac:spMkLst>
+            <pc:docMk/>
+            <pc:sldMk cId="2654742094" sldId="269"/>
+            <ac:spMk id="17" creationId="{C18BDF3F-611F-1A61-3A9F-4D5E8BD73C77}"/>
+          </ac:spMkLst>
+        </pc:spChg>
+        <pc:spChg chg="mod">
+          <ac:chgData name="Thiago Henrique Gomes Panini" userId="cc6a5c77081c362d" providerId="LiveId" clId="{EED3D3E7-5518-44F8-8186-31A285105760}" dt="2023-02-03T21:40:37.243" v="790" actId="1076"/>
+          <ac:spMkLst>
+            <pc:docMk/>
+            <pc:sldMk cId="2654742094" sldId="269"/>
+            <ac:spMk id="18" creationId="{5EEF508B-AF49-4F88-6A7F-9430BC757A70}"/>
+          </ac:spMkLst>
+        </pc:spChg>
+        <pc:spChg chg="mod">
+          <ac:chgData name="Thiago Henrique Gomes Panini" userId="cc6a5c77081c362d" providerId="LiveId" clId="{EED3D3E7-5518-44F8-8186-31A285105760}" dt="2023-02-03T21:40:37.243" v="790" actId="1076"/>
+          <ac:spMkLst>
+            <pc:docMk/>
+            <pc:sldMk cId="2654742094" sldId="269"/>
+            <ac:spMk id="19" creationId="{0039A76C-73AC-29C6-6C7B-22BFD5941EDD}"/>
+          </ac:spMkLst>
+        </pc:spChg>
+        <pc:spChg chg="mod">
+          <ac:chgData name="Thiago Henrique Gomes Panini" userId="cc6a5c77081c362d" providerId="LiveId" clId="{EED3D3E7-5518-44F8-8186-31A285105760}" dt="2023-02-03T21:40:37.243" v="790" actId="1076"/>
+          <ac:spMkLst>
+            <pc:docMk/>
+            <pc:sldMk cId="2654742094" sldId="269"/>
+            <ac:spMk id="20" creationId="{13511F5C-1398-7ED7-596C-D0A43E75CA92}"/>
+          </ac:spMkLst>
+        </pc:spChg>
+        <pc:spChg chg="mod">
+          <ac:chgData name="Thiago Henrique Gomes Panini" userId="cc6a5c77081c362d" providerId="LiveId" clId="{EED3D3E7-5518-44F8-8186-31A285105760}" dt="2023-02-03T21:40:37.243" v="790" actId="1076"/>
+          <ac:spMkLst>
+            <pc:docMk/>
+            <pc:sldMk cId="2654742094" sldId="269"/>
+            <ac:spMk id="21" creationId="{2819C677-A08D-442B-B1F7-198A30EFFC3D}"/>
+          </ac:spMkLst>
+        </pc:spChg>
+        <pc:spChg chg="mod">
+          <ac:chgData name="Thiago Henrique Gomes Panini" userId="cc6a5c77081c362d" providerId="LiveId" clId="{EED3D3E7-5518-44F8-8186-31A285105760}" dt="2023-02-03T21:40:37.243" v="790" actId="1076"/>
+          <ac:spMkLst>
+            <pc:docMk/>
+            <pc:sldMk cId="2654742094" sldId="269"/>
+            <ac:spMk id="22" creationId="{337EE1B1-F746-A1F3-6F4E-B711AC370105}"/>
+          </ac:spMkLst>
+        </pc:spChg>
+        <pc:spChg chg="mod">
+          <ac:chgData name="Thiago Henrique Gomes Panini" userId="cc6a5c77081c362d" providerId="LiveId" clId="{EED3D3E7-5518-44F8-8186-31A285105760}" dt="2023-02-03T21:40:37.243" v="790" actId="1076"/>
+          <ac:spMkLst>
+            <pc:docMk/>
+            <pc:sldMk cId="2654742094" sldId="269"/>
+            <ac:spMk id="23" creationId="{ED2CBDDB-AC5C-F5CF-3FFE-E29F92159969}"/>
+          </ac:spMkLst>
+        </pc:spChg>
+        <pc:spChg chg="mod">
+          <ac:chgData name="Thiago Henrique Gomes Panini" userId="cc6a5c77081c362d" providerId="LiveId" clId="{EED3D3E7-5518-44F8-8186-31A285105760}" dt="2023-02-03T21:40:37.243" v="790" actId="1076"/>
+          <ac:spMkLst>
+            <pc:docMk/>
+            <pc:sldMk cId="2654742094" sldId="269"/>
+            <ac:spMk id="24" creationId="{A36F4CD3-B3A5-4F33-4090-07A016608FFD}"/>
+          </ac:spMkLst>
+        </pc:spChg>
+        <pc:spChg chg="mod">
+          <ac:chgData name="Thiago Henrique Gomes Panini" userId="cc6a5c77081c362d" providerId="LiveId" clId="{EED3D3E7-5518-44F8-8186-31A285105760}" dt="2023-02-03T21:40:37.243" v="790" actId="1076"/>
+          <ac:spMkLst>
+            <pc:docMk/>
+            <pc:sldMk cId="2654742094" sldId="269"/>
+            <ac:spMk id="25" creationId="{8CA67663-539D-0F53-B369-0CD3EE24481E}"/>
+          </ac:spMkLst>
+        </pc:spChg>
+        <pc:spChg chg="mod">
+          <ac:chgData name="Thiago Henrique Gomes Panini" userId="cc6a5c77081c362d" providerId="LiveId" clId="{EED3D3E7-5518-44F8-8186-31A285105760}" dt="2023-02-03T21:40:37.243" v="790" actId="1076"/>
+          <ac:spMkLst>
+            <pc:docMk/>
+            <pc:sldMk cId="2654742094" sldId="269"/>
+            <ac:spMk id="26" creationId="{C9FDC87A-EBBA-6ABD-465C-05DA220F83FB}"/>
+          </ac:spMkLst>
+        </pc:spChg>
+        <pc:spChg chg="mod">
+          <ac:chgData name="Thiago Henrique Gomes Panini" userId="cc6a5c77081c362d" providerId="LiveId" clId="{EED3D3E7-5518-44F8-8186-31A285105760}" dt="2023-02-03T21:40:37.243" v="790" actId="1076"/>
+          <ac:spMkLst>
+            <pc:docMk/>
+            <pc:sldMk cId="2654742094" sldId="269"/>
+            <ac:spMk id="27" creationId="{DD3D0A7E-B708-2F94-0BBC-4286C1DEC17E}"/>
+          </ac:spMkLst>
+        </pc:spChg>
+        <pc:spChg chg="mod">
+          <ac:chgData name="Thiago Henrique Gomes Panini" userId="cc6a5c77081c362d" providerId="LiveId" clId="{EED3D3E7-5518-44F8-8186-31A285105760}" dt="2023-02-03T21:40:37.243" v="790" actId="1076"/>
+          <ac:spMkLst>
+            <pc:docMk/>
+            <pc:sldMk cId="2654742094" sldId="269"/>
+            <ac:spMk id="28" creationId="{B5408CA4-6DF6-D839-206A-3930FBBCB60E}"/>
+          </ac:spMkLst>
+        </pc:spChg>
+        <pc:spChg chg="mod">
+          <ac:chgData name="Thiago Henrique Gomes Panini" userId="cc6a5c77081c362d" providerId="LiveId" clId="{EED3D3E7-5518-44F8-8186-31A285105760}" dt="2023-02-03T21:40:37.243" v="790" actId="1076"/>
+          <ac:spMkLst>
+            <pc:docMk/>
+            <pc:sldMk cId="2654742094" sldId="269"/>
+            <ac:spMk id="29" creationId="{D60291B7-901C-C69F-5ABA-77E19D09310A}"/>
+          </ac:spMkLst>
+        </pc:spChg>
+        <pc:spChg chg="mod">
+          <ac:chgData name="Thiago Henrique Gomes Panini" userId="cc6a5c77081c362d" providerId="LiveId" clId="{EED3D3E7-5518-44F8-8186-31A285105760}" dt="2023-02-03T21:40:37.243" v="790" actId="1076"/>
+          <ac:spMkLst>
+            <pc:docMk/>
+            <pc:sldMk cId="2654742094" sldId="269"/>
+            <ac:spMk id="30" creationId="{A63E48D2-8275-DFBE-A397-BC3A5BA55EBD}"/>
+          </ac:spMkLst>
+        </pc:spChg>
+        <pc:spChg chg="mod">
+          <ac:chgData name="Thiago Henrique Gomes Panini" userId="cc6a5c77081c362d" providerId="LiveId" clId="{EED3D3E7-5518-44F8-8186-31A285105760}" dt="2023-02-03T21:40:37.243" v="790" actId="1076"/>
+          <ac:spMkLst>
+            <pc:docMk/>
+            <pc:sldMk cId="2654742094" sldId="269"/>
+            <ac:spMk id="31" creationId="{8C2BC282-952F-C5A4-A9E3-F9DD6A706890}"/>
+          </ac:spMkLst>
+        </pc:spChg>
+        <pc:spChg chg="mod">
+          <ac:chgData name="Thiago Henrique Gomes Panini" userId="cc6a5c77081c362d" providerId="LiveId" clId="{EED3D3E7-5518-44F8-8186-31A285105760}" dt="2023-02-03T21:40:37.243" v="790" actId="1076"/>
+          <ac:spMkLst>
+            <pc:docMk/>
+            <pc:sldMk cId="2654742094" sldId="269"/>
+            <ac:spMk id="35" creationId="{2D33BAC0-81DE-48B1-1840-A0A2E4E78CC3}"/>
+          </ac:spMkLst>
+        </pc:spChg>
+        <pc:spChg chg="mod">
+          <ac:chgData name="Thiago Henrique Gomes Panini" userId="cc6a5c77081c362d" providerId="LiveId" clId="{EED3D3E7-5518-44F8-8186-31A285105760}" dt="2023-02-03T21:40:37.243" v="790" actId="1076"/>
+          <ac:spMkLst>
+            <pc:docMk/>
+            <pc:sldMk cId="2654742094" sldId="269"/>
+            <ac:spMk id="36" creationId="{FDF72132-9DDD-D75B-93AE-2D161698A359}"/>
+          </ac:spMkLst>
+        </pc:spChg>
+        <pc:spChg chg="mod">
+          <ac:chgData name="Thiago Henrique Gomes Panini" userId="cc6a5c77081c362d" providerId="LiveId" clId="{EED3D3E7-5518-44F8-8186-31A285105760}" dt="2023-02-03T21:40:37.243" v="790" actId="1076"/>
+          <ac:spMkLst>
+            <pc:docMk/>
+            <pc:sldMk cId="2654742094" sldId="269"/>
+            <ac:spMk id="37" creationId="{5D786D0D-E231-3F5D-9C66-FAF59EC6FEB4}"/>
+          </ac:spMkLst>
+        </pc:spChg>
+        <pc:spChg chg="mod">
+          <ac:chgData name="Thiago Henrique Gomes Panini" userId="cc6a5c77081c362d" providerId="LiveId" clId="{EED3D3E7-5518-44F8-8186-31A285105760}" dt="2023-02-03T21:40:37.243" v="790" actId="1076"/>
+          <ac:spMkLst>
+            <pc:docMk/>
+            <pc:sldMk cId="2654742094" sldId="269"/>
+            <ac:spMk id="38" creationId="{FD9C234E-2F3D-3163-AA1B-F7F41E61BA29}"/>
+          </ac:spMkLst>
+        </pc:spChg>
+        <pc:spChg chg="mod">
+          <ac:chgData name="Thiago Henrique Gomes Panini" userId="cc6a5c77081c362d" providerId="LiveId" clId="{EED3D3E7-5518-44F8-8186-31A285105760}" dt="2023-02-03T21:40:37.243" v="790" actId="1076"/>
+          <ac:spMkLst>
+            <pc:docMk/>
+            <pc:sldMk cId="2654742094" sldId="269"/>
+            <ac:spMk id="39" creationId="{01746B89-3E1F-C919-E610-C265FE7F18D5}"/>
+          </ac:spMkLst>
+        </pc:spChg>
+        <pc:spChg chg="mod">
+          <ac:chgData name="Thiago Henrique Gomes Panini" userId="cc6a5c77081c362d" providerId="LiveId" clId="{EED3D3E7-5518-44F8-8186-31A285105760}" dt="2023-02-03T21:40:37.243" v="790" actId="1076"/>
+          <ac:spMkLst>
+            <pc:docMk/>
+            <pc:sldMk cId="2654742094" sldId="269"/>
+            <ac:spMk id="40" creationId="{CDB05AD8-425C-3943-D1D5-7DE6D8DF0863}"/>
+          </ac:spMkLst>
+        </pc:spChg>
+        <pc:spChg chg="mod">
+          <ac:chgData name="Thiago Henrique Gomes Panini" userId="cc6a5c77081c362d" providerId="LiveId" clId="{EED3D3E7-5518-44F8-8186-31A285105760}" dt="2023-02-03T21:40:37.243" v="790" actId="1076"/>
+          <ac:spMkLst>
+            <pc:docMk/>
+            <pc:sldMk cId="2654742094" sldId="269"/>
+            <ac:spMk id="41" creationId="{24CB550A-2FE2-59CF-BD47-F287A4CCA142}"/>
+          </ac:spMkLst>
+        </pc:spChg>
+        <pc:spChg chg="mod">
+          <ac:chgData name="Thiago Henrique Gomes Panini" userId="cc6a5c77081c362d" providerId="LiveId" clId="{EED3D3E7-5518-44F8-8186-31A285105760}" dt="2023-02-03T21:40:37.243" v="790" actId="1076"/>
+          <ac:spMkLst>
+            <pc:docMk/>
+            <pc:sldMk cId="2654742094" sldId="269"/>
+            <ac:spMk id="42" creationId="{9CA8EFB5-3677-3259-2583-8AA14109E76B}"/>
+          </ac:spMkLst>
+        </pc:spChg>
+        <pc:spChg chg="mod">
+          <ac:chgData name="Thiago Henrique Gomes Panini" userId="cc6a5c77081c362d" providerId="LiveId" clId="{EED3D3E7-5518-44F8-8186-31A285105760}" dt="2023-02-03T21:40:37.243" v="790" actId="1076"/>
+          <ac:spMkLst>
+            <pc:docMk/>
+            <pc:sldMk cId="2654742094" sldId="269"/>
+            <ac:spMk id="43" creationId="{6D3EA850-B117-43C9-FA41-12BA5022B7B9}"/>
+          </ac:spMkLst>
+        </pc:spChg>
+        <pc:spChg chg="mod">
+          <ac:chgData name="Thiago Henrique Gomes Panini" userId="cc6a5c77081c362d" providerId="LiveId" clId="{EED3D3E7-5518-44F8-8186-31A285105760}" dt="2023-02-03T21:40:37.243" v="790" actId="1076"/>
+          <ac:spMkLst>
+            <pc:docMk/>
+            <pc:sldMk cId="2654742094" sldId="269"/>
+            <ac:spMk id="44" creationId="{06BAFEBE-58C1-B9DC-56F3-41D81410D8CF}"/>
+          </ac:spMkLst>
+        </pc:spChg>
+        <pc:spChg chg="mod">
+          <ac:chgData name="Thiago Henrique Gomes Panini" userId="cc6a5c77081c362d" providerId="LiveId" clId="{EED3D3E7-5518-44F8-8186-31A285105760}" dt="2023-02-03T21:40:37.243" v="790" actId="1076"/>
+          <ac:spMkLst>
+            <pc:docMk/>
+            <pc:sldMk cId="2654742094" sldId="269"/>
+            <ac:spMk id="45" creationId="{4D336F81-E051-E1B3-3F46-38F9D8E028F0}"/>
+          </ac:spMkLst>
+        </pc:spChg>
+        <pc:spChg chg="mod">
+          <ac:chgData name="Thiago Henrique Gomes Panini" userId="cc6a5c77081c362d" providerId="LiveId" clId="{EED3D3E7-5518-44F8-8186-31A285105760}" dt="2023-02-03T21:40:37.243" v="790" actId="1076"/>
+          <ac:spMkLst>
+            <pc:docMk/>
+            <pc:sldMk cId="2654742094" sldId="269"/>
+            <ac:spMk id="46" creationId="{02F7F6D7-D558-E2E0-86A6-B3A5F76200C6}"/>
+          </ac:spMkLst>
+        </pc:spChg>
+        <pc:spChg chg="mod">
+          <ac:chgData name="Thiago Henrique Gomes Panini" userId="cc6a5c77081c362d" providerId="LiveId" clId="{EED3D3E7-5518-44F8-8186-31A285105760}" dt="2023-02-03T21:40:37.243" v="790" actId="1076"/>
+          <ac:spMkLst>
+            <pc:docMk/>
+            <pc:sldMk cId="2654742094" sldId="269"/>
+            <ac:spMk id="47" creationId="{56E8FAC5-ED82-C07C-89D9-052B3E8DF890}"/>
+          </ac:spMkLst>
+        </pc:spChg>
+        <pc:spChg chg="mod">
+          <ac:chgData name="Thiago Henrique Gomes Panini" userId="cc6a5c77081c362d" providerId="LiveId" clId="{EED3D3E7-5518-44F8-8186-31A285105760}" dt="2023-02-03T21:40:37.243" v="790" actId="1076"/>
+          <ac:spMkLst>
+            <pc:docMk/>
+            <pc:sldMk cId="2654742094" sldId="269"/>
+            <ac:spMk id="48" creationId="{DA804A95-8C4E-FF37-28CA-CD340E330241}"/>
+          </ac:spMkLst>
+        </pc:spChg>
+        <pc:spChg chg="mod">
+          <ac:chgData name="Thiago Henrique Gomes Panini" userId="cc6a5c77081c362d" providerId="LiveId" clId="{EED3D3E7-5518-44F8-8186-31A285105760}" dt="2023-02-03T21:40:37.243" v="790" actId="1076"/>
+          <ac:spMkLst>
+            <pc:docMk/>
+            <pc:sldMk cId="2654742094" sldId="269"/>
+            <ac:spMk id="49" creationId="{3A3028F4-926C-DA74-3B95-7F8688C4482B}"/>
+          </ac:spMkLst>
+        </pc:spChg>
+        <pc:spChg chg="mod">
+          <ac:chgData name="Thiago Henrique Gomes Panini" userId="cc6a5c77081c362d" providerId="LiveId" clId="{EED3D3E7-5518-44F8-8186-31A285105760}" dt="2023-02-03T21:40:42.200" v="792"/>
+          <ac:spMkLst>
+            <pc:docMk/>
+            <pc:sldMk cId="2654742094" sldId="269"/>
+            <ac:spMk id="51" creationId="{AC1019FE-76A2-1BAF-67B2-D87C176D579D}"/>
+          </ac:spMkLst>
+        </pc:spChg>
+        <pc:spChg chg="mod">
+          <ac:chgData name="Thiago Henrique Gomes Panini" userId="cc6a5c77081c362d" providerId="LiveId" clId="{EED3D3E7-5518-44F8-8186-31A285105760}" dt="2023-02-03T21:40:42.200" v="792"/>
+          <ac:spMkLst>
+            <pc:docMk/>
+            <pc:sldMk cId="2654742094" sldId="269"/>
+            <ac:spMk id="52" creationId="{847004A9-3486-BC2F-4C5F-E622F7D26400}"/>
+          </ac:spMkLst>
+        </pc:spChg>
+        <pc:spChg chg="mod">
+          <ac:chgData name="Thiago Henrique Gomes Panini" userId="cc6a5c77081c362d" providerId="LiveId" clId="{EED3D3E7-5518-44F8-8186-31A285105760}" dt="2023-02-03T21:40:42.200" v="792"/>
+          <ac:spMkLst>
+            <pc:docMk/>
+            <pc:sldMk cId="2654742094" sldId="269"/>
+            <ac:spMk id="53" creationId="{EE079998-8AA5-3737-A10F-36F64DAC347A}"/>
+          </ac:spMkLst>
+        </pc:spChg>
+        <pc:spChg chg="mod">
+          <ac:chgData name="Thiago Henrique Gomes Panini" userId="cc6a5c77081c362d" providerId="LiveId" clId="{EED3D3E7-5518-44F8-8186-31A285105760}" dt="2023-02-03T21:40:42.200" v="792"/>
+          <ac:spMkLst>
+            <pc:docMk/>
+            <pc:sldMk cId="2654742094" sldId="269"/>
+            <ac:spMk id="54" creationId="{2A31CEBF-DB74-FE19-7B57-FF411037DA55}"/>
+          </ac:spMkLst>
+        </pc:spChg>
+        <pc:spChg chg="mod">
+          <ac:chgData name="Thiago Henrique Gomes Panini" userId="cc6a5c77081c362d" providerId="LiveId" clId="{EED3D3E7-5518-44F8-8186-31A285105760}" dt="2023-02-03T21:40:42.200" v="792"/>
+          <ac:spMkLst>
+            <pc:docMk/>
+            <pc:sldMk cId="2654742094" sldId="269"/>
+            <ac:spMk id="55" creationId="{D67B0961-B052-1C3A-793B-0D8501F2B059}"/>
+          </ac:spMkLst>
+        </pc:spChg>
+        <pc:spChg chg="mod">
+          <ac:chgData name="Thiago Henrique Gomes Panini" userId="cc6a5c77081c362d" providerId="LiveId" clId="{EED3D3E7-5518-44F8-8186-31A285105760}" dt="2023-02-03T21:40:42.200" v="792"/>
+          <ac:spMkLst>
+            <pc:docMk/>
+            <pc:sldMk cId="2654742094" sldId="269"/>
+            <ac:spMk id="56" creationId="{AE2F1CCF-F275-880D-93C1-14098954F0C5}"/>
+          </ac:spMkLst>
+        </pc:spChg>
+        <pc:spChg chg="mod">
+          <ac:chgData name="Thiago Henrique Gomes Panini" userId="cc6a5c77081c362d" providerId="LiveId" clId="{EED3D3E7-5518-44F8-8186-31A285105760}" dt="2023-02-03T21:40:42.200" v="792"/>
+          <ac:spMkLst>
+            <pc:docMk/>
+            <pc:sldMk cId="2654742094" sldId="269"/>
+            <ac:spMk id="57" creationId="{83B80DE5-A54C-772E-A956-5CDF969B4AF8}"/>
+          </ac:spMkLst>
+        </pc:spChg>
+        <pc:spChg chg="mod">
+          <ac:chgData name="Thiago Henrique Gomes Panini" userId="cc6a5c77081c362d" providerId="LiveId" clId="{EED3D3E7-5518-44F8-8186-31A285105760}" dt="2023-02-03T21:40:42.200" v="792"/>
+          <ac:spMkLst>
+            <pc:docMk/>
+            <pc:sldMk cId="2654742094" sldId="269"/>
+            <ac:spMk id="58" creationId="{7D7DAD0A-E2CF-8BDD-4D63-6279B7104C51}"/>
+          </ac:spMkLst>
+        </pc:spChg>
+        <pc:spChg chg="mod">
+          <ac:chgData name="Thiago Henrique Gomes Panini" userId="cc6a5c77081c362d" providerId="LiveId" clId="{EED3D3E7-5518-44F8-8186-31A285105760}" dt="2023-02-03T21:40:42.200" v="792"/>
+          <ac:spMkLst>
+            <pc:docMk/>
+            <pc:sldMk cId="2654742094" sldId="269"/>
+            <ac:spMk id="59" creationId="{4072F32A-3FA5-CC7D-CE85-1A2B7A724AA8}"/>
+          </ac:spMkLst>
+        </pc:spChg>
+        <pc:spChg chg="mod">
+          <ac:chgData name="Thiago Henrique Gomes Panini" userId="cc6a5c77081c362d" providerId="LiveId" clId="{EED3D3E7-5518-44F8-8186-31A285105760}" dt="2023-02-03T21:40:42.200" v="792"/>
+          <ac:spMkLst>
+            <pc:docMk/>
+            <pc:sldMk cId="2654742094" sldId="269"/>
+            <ac:spMk id="60" creationId="{0857709E-4921-906E-F68E-EC35D49917DA}"/>
+          </ac:spMkLst>
+        </pc:spChg>
+        <pc:spChg chg="mod">
+          <ac:chgData name="Thiago Henrique Gomes Panini" userId="cc6a5c77081c362d" providerId="LiveId" clId="{EED3D3E7-5518-44F8-8186-31A285105760}" dt="2023-02-03T21:40:42.200" v="792"/>
+          <ac:spMkLst>
+            <pc:docMk/>
+            <pc:sldMk cId="2654742094" sldId="269"/>
+            <ac:spMk id="61" creationId="{881E2923-D43B-573D-94ED-B7C840B70435}"/>
+          </ac:spMkLst>
+        </pc:spChg>
+        <pc:spChg chg="mod">
+          <ac:chgData name="Thiago Henrique Gomes Panini" userId="cc6a5c77081c362d" providerId="LiveId" clId="{EED3D3E7-5518-44F8-8186-31A285105760}" dt="2023-02-03T21:40:42.200" v="792"/>
+          <ac:spMkLst>
+            <pc:docMk/>
+            <pc:sldMk cId="2654742094" sldId="269"/>
+            <ac:spMk id="62" creationId="{1057C10D-03C2-21B8-FD4F-0ACAC096682B}"/>
+          </ac:spMkLst>
+        </pc:spChg>
+        <pc:spChg chg="mod">
+          <ac:chgData name="Thiago Henrique Gomes Panini" userId="cc6a5c77081c362d" providerId="LiveId" clId="{EED3D3E7-5518-44F8-8186-31A285105760}" dt="2023-02-03T21:40:42.200" v="792"/>
+          <ac:spMkLst>
+            <pc:docMk/>
+            <pc:sldMk cId="2654742094" sldId="269"/>
+            <ac:spMk id="63" creationId="{139F36AD-73E7-2CC7-A675-F14C6F7DA985}"/>
+          </ac:spMkLst>
+        </pc:spChg>
+        <pc:spChg chg="mod">
+          <ac:chgData name="Thiago Henrique Gomes Panini" userId="cc6a5c77081c362d" providerId="LiveId" clId="{EED3D3E7-5518-44F8-8186-31A285105760}" dt="2023-02-03T21:40:42.200" v="792"/>
+          <ac:spMkLst>
+            <pc:docMk/>
+            <pc:sldMk cId="2654742094" sldId="269"/>
+            <ac:spMk id="64" creationId="{BC82BEE9-7873-8365-3ADA-AB600265A486}"/>
+          </ac:spMkLst>
+        </pc:spChg>
+        <pc:spChg chg="mod">
+          <ac:chgData name="Thiago Henrique Gomes Panini" userId="cc6a5c77081c362d" providerId="LiveId" clId="{EED3D3E7-5518-44F8-8186-31A285105760}" dt="2023-02-03T21:40:42.200" v="792"/>
+          <ac:spMkLst>
+            <pc:docMk/>
+            <pc:sldMk cId="2654742094" sldId="269"/>
+            <ac:spMk id="65" creationId="{002E900B-6B17-9EBB-AD4B-6323728B21AF}"/>
+          </ac:spMkLst>
+        </pc:spChg>
+        <pc:spChg chg="mod">
+          <ac:chgData name="Thiago Henrique Gomes Panini" userId="cc6a5c77081c362d" providerId="LiveId" clId="{EED3D3E7-5518-44F8-8186-31A285105760}" dt="2023-02-03T21:40:42.200" v="792"/>
+          <ac:spMkLst>
+            <pc:docMk/>
+            <pc:sldMk cId="2654742094" sldId="269"/>
+            <ac:spMk id="66" creationId="{0CA1E16E-DABC-BD95-53A9-BF8032D4F47D}"/>
+          </ac:spMkLst>
+        </pc:spChg>
+        <pc:spChg chg="mod">
+          <ac:chgData name="Thiago Henrique Gomes Panini" userId="cc6a5c77081c362d" providerId="LiveId" clId="{EED3D3E7-5518-44F8-8186-31A285105760}" dt="2023-02-03T21:40:42.200" v="792"/>
+          <ac:spMkLst>
+            <pc:docMk/>
+            <pc:sldMk cId="2654742094" sldId="269"/>
+            <ac:spMk id="67" creationId="{50864C51-0DEC-9CB4-26EA-DBC2EAA5699B}"/>
+          </ac:spMkLst>
+        </pc:spChg>
+        <pc:spChg chg="mod">
+          <ac:chgData name="Thiago Henrique Gomes Panini" userId="cc6a5c77081c362d" providerId="LiveId" clId="{EED3D3E7-5518-44F8-8186-31A285105760}" dt="2023-02-03T21:40:42.200" v="792"/>
+          <ac:spMkLst>
+            <pc:docMk/>
+            <pc:sldMk cId="2654742094" sldId="269"/>
+            <ac:spMk id="68" creationId="{C65ABB68-A88F-4E1F-1828-50632F1DE105}"/>
+          </ac:spMkLst>
+        </pc:spChg>
+        <pc:spChg chg="mod">
+          <ac:chgData name="Thiago Henrique Gomes Panini" userId="cc6a5c77081c362d" providerId="LiveId" clId="{EED3D3E7-5518-44F8-8186-31A285105760}" dt="2023-02-03T21:40:42.200" v="792"/>
+          <ac:spMkLst>
+            <pc:docMk/>
+            <pc:sldMk cId="2654742094" sldId="269"/>
+            <ac:spMk id="69" creationId="{CB52953A-3010-F055-D1EF-6897891DC76A}"/>
+          </ac:spMkLst>
+        </pc:spChg>
+        <pc:spChg chg="mod">
+          <ac:chgData name="Thiago Henrique Gomes Panini" userId="cc6a5c77081c362d" providerId="LiveId" clId="{EED3D3E7-5518-44F8-8186-31A285105760}" dt="2023-02-03T21:40:42.200" v="792"/>
+          <ac:spMkLst>
+            <pc:docMk/>
+            <pc:sldMk cId="2654742094" sldId="269"/>
+            <ac:spMk id="70" creationId="{E4D98C6F-E545-32B7-97BA-ED3407A2AD1D}"/>
+          </ac:spMkLst>
+        </pc:spChg>
+        <pc:spChg chg="mod">
+          <ac:chgData name="Thiago Henrique Gomes Panini" userId="cc6a5c77081c362d" providerId="LiveId" clId="{EED3D3E7-5518-44F8-8186-31A285105760}" dt="2023-02-03T21:40:42.200" v="792"/>
+          <ac:spMkLst>
+            <pc:docMk/>
+            <pc:sldMk cId="2654742094" sldId="269"/>
+            <ac:spMk id="71" creationId="{C7F8B578-5430-4CC5-68EE-8749D172B4F2}"/>
+          </ac:spMkLst>
+        </pc:spChg>
+        <pc:spChg chg="mod">
+          <ac:chgData name="Thiago Henrique Gomes Panini" userId="cc6a5c77081c362d" providerId="LiveId" clId="{EED3D3E7-5518-44F8-8186-31A285105760}" dt="2023-02-03T21:40:42.200" v="792"/>
+          <ac:spMkLst>
+            <pc:docMk/>
+            <pc:sldMk cId="2654742094" sldId="269"/>
+            <ac:spMk id="72" creationId="{EF8EF934-885A-4E42-2E00-402644123764}"/>
+          </ac:spMkLst>
+        </pc:spChg>
+        <pc:spChg chg="mod">
+          <ac:chgData name="Thiago Henrique Gomes Panini" userId="cc6a5c77081c362d" providerId="LiveId" clId="{EED3D3E7-5518-44F8-8186-31A285105760}" dt="2023-02-03T21:40:42.200" v="792"/>
+          <ac:spMkLst>
+            <pc:docMk/>
+            <pc:sldMk cId="2654742094" sldId="269"/>
+            <ac:spMk id="76" creationId="{C5AD38AB-9EED-3F72-58D3-3882A63A2BBF}"/>
+          </ac:spMkLst>
+        </pc:spChg>
+        <pc:spChg chg="mod">
+          <ac:chgData name="Thiago Henrique Gomes Panini" userId="cc6a5c77081c362d" providerId="LiveId" clId="{EED3D3E7-5518-44F8-8186-31A285105760}" dt="2023-02-03T21:40:42.200" v="792"/>
+          <ac:spMkLst>
+            <pc:docMk/>
+            <pc:sldMk cId="2654742094" sldId="269"/>
+            <ac:spMk id="77" creationId="{718111B7-1B6A-240A-4EE6-0C75768D6492}"/>
+          </ac:spMkLst>
+        </pc:spChg>
+        <pc:spChg chg="mod">
+          <ac:chgData name="Thiago Henrique Gomes Panini" userId="cc6a5c77081c362d" providerId="LiveId" clId="{EED3D3E7-5518-44F8-8186-31A285105760}" dt="2023-02-03T21:40:42.200" v="792"/>
+          <ac:spMkLst>
+            <pc:docMk/>
+            <pc:sldMk cId="2654742094" sldId="269"/>
+            <ac:spMk id="78" creationId="{E73C0A37-DB90-1AC0-8B4A-DEAAFADB8913}"/>
+          </ac:spMkLst>
+        </pc:spChg>
+        <pc:spChg chg="mod">
+          <ac:chgData name="Thiago Henrique Gomes Panini" userId="cc6a5c77081c362d" providerId="LiveId" clId="{EED3D3E7-5518-44F8-8186-31A285105760}" dt="2023-02-03T21:40:42.200" v="792"/>
+          <ac:spMkLst>
+            <pc:docMk/>
+            <pc:sldMk cId="2654742094" sldId="269"/>
+            <ac:spMk id="79" creationId="{C09AB76E-9C1C-382D-6802-13D16D3D7DB4}"/>
+          </ac:spMkLst>
+        </pc:spChg>
+        <pc:spChg chg="mod">
+          <ac:chgData name="Thiago Henrique Gomes Panini" userId="cc6a5c77081c362d" providerId="LiveId" clId="{EED3D3E7-5518-44F8-8186-31A285105760}" dt="2023-02-03T21:40:42.200" v="792"/>
+          <ac:spMkLst>
+            <pc:docMk/>
+            <pc:sldMk cId="2654742094" sldId="269"/>
+            <ac:spMk id="80" creationId="{FAB3C47B-2D31-D528-911C-1663B5C8D7B5}"/>
+          </ac:spMkLst>
+        </pc:spChg>
+        <pc:spChg chg="mod">
+          <ac:chgData name="Thiago Henrique Gomes Panini" userId="cc6a5c77081c362d" providerId="LiveId" clId="{EED3D3E7-5518-44F8-8186-31A285105760}" dt="2023-02-03T21:40:42.200" v="792"/>
+          <ac:spMkLst>
+            <pc:docMk/>
+            <pc:sldMk cId="2654742094" sldId="269"/>
+            <ac:spMk id="81" creationId="{77D2BF12-9441-B865-F8A6-DE6D37EBD41B}"/>
+          </ac:spMkLst>
+        </pc:spChg>
+        <pc:spChg chg="mod">
+          <ac:chgData name="Thiago Henrique Gomes Panini" userId="cc6a5c77081c362d" providerId="LiveId" clId="{EED3D3E7-5518-44F8-8186-31A285105760}" dt="2023-02-03T21:40:42.200" v="792"/>
+          <ac:spMkLst>
+            <pc:docMk/>
+            <pc:sldMk cId="2654742094" sldId="269"/>
+            <ac:spMk id="82" creationId="{55C7DBFC-EBDB-A639-5A3C-4C1E41969333}"/>
+          </ac:spMkLst>
+        </pc:spChg>
+        <pc:spChg chg="mod">
+          <ac:chgData name="Thiago Henrique Gomes Panini" userId="cc6a5c77081c362d" providerId="LiveId" clId="{EED3D3E7-5518-44F8-8186-31A285105760}" dt="2023-02-03T21:40:42.200" v="792"/>
+          <ac:spMkLst>
+            <pc:docMk/>
+            <pc:sldMk cId="2654742094" sldId="269"/>
+            <ac:spMk id="83" creationId="{F4B7C915-714C-A647-79C2-CBC2A46021FD}"/>
+          </ac:spMkLst>
+        </pc:spChg>
+        <pc:spChg chg="mod">
+          <ac:chgData name="Thiago Henrique Gomes Panini" userId="cc6a5c77081c362d" providerId="LiveId" clId="{EED3D3E7-5518-44F8-8186-31A285105760}" dt="2023-02-03T21:40:42.200" v="792"/>
+          <ac:spMkLst>
+            <pc:docMk/>
+            <pc:sldMk cId="2654742094" sldId="269"/>
+            <ac:spMk id="84" creationId="{65FEF4B1-7B25-5891-18B1-2F0DF9791146}"/>
+          </ac:spMkLst>
+        </pc:spChg>
+        <pc:spChg chg="mod">
+          <ac:chgData name="Thiago Henrique Gomes Panini" userId="cc6a5c77081c362d" providerId="LiveId" clId="{EED3D3E7-5518-44F8-8186-31A285105760}" dt="2023-02-03T21:40:42.200" v="792"/>
+          <ac:spMkLst>
+            <pc:docMk/>
+            <pc:sldMk cId="2654742094" sldId="269"/>
+            <ac:spMk id="85" creationId="{C63B2C2C-4E62-5408-2D1F-D3603165B4E2}"/>
+          </ac:spMkLst>
+        </pc:spChg>
+        <pc:spChg chg="mod">
+          <ac:chgData name="Thiago Henrique Gomes Panini" userId="cc6a5c77081c362d" providerId="LiveId" clId="{EED3D3E7-5518-44F8-8186-31A285105760}" dt="2023-02-03T21:40:42.200" v="792"/>
+          <ac:spMkLst>
+            <pc:docMk/>
+            <pc:sldMk cId="2654742094" sldId="269"/>
+            <ac:spMk id="86" creationId="{0C98E43C-E2B1-A0F4-A02B-F19F977F2C1D}"/>
+          </ac:spMkLst>
+        </pc:spChg>
+        <pc:spChg chg="mod">
+          <ac:chgData name="Thiago Henrique Gomes Panini" userId="cc6a5c77081c362d" providerId="LiveId" clId="{EED3D3E7-5518-44F8-8186-31A285105760}" dt="2023-02-03T21:40:42.200" v="792"/>
+          <ac:spMkLst>
+            <pc:docMk/>
+            <pc:sldMk cId="2654742094" sldId="269"/>
+            <ac:spMk id="87" creationId="{2268711E-02C4-FD63-8F4C-9DBA629992AC}"/>
+          </ac:spMkLst>
+        </pc:spChg>
+        <pc:spChg chg="mod">
+          <ac:chgData name="Thiago Henrique Gomes Panini" userId="cc6a5c77081c362d" providerId="LiveId" clId="{EED3D3E7-5518-44F8-8186-31A285105760}" dt="2023-02-03T21:40:42.200" v="792"/>
+          <ac:spMkLst>
+            <pc:docMk/>
+            <pc:sldMk cId="2654742094" sldId="269"/>
+            <ac:spMk id="88" creationId="{C65FCBB4-DDE1-FCDD-0DCA-F06498235297}"/>
+          </ac:spMkLst>
+        </pc:spChg>
+        <pc:spChg chg="mod">
+          <ac:chgData name="Thiago Henrique Gomes Panini" userId="cc6a5c77081c362d" providerId="LiveId" clId="{EED3D3E7-5518-44F8-8186-31A285105760}" dt="2023-02-03T21:40:42.200" v="792"/>
+          <ac:spMkLst>
+            <pc:docMk/>
+            <pc:sldMk cId="2654742094" sldId="269"/>
+            <ac:spMk id="90" creationId="{4F3D2EE9-6637-06F4-BF3C-DFAEEE63FB07}"/>
+          </ac:spMkLst>
+        </pc:spChg>
+        <pc:spChg chg="mod">
+          <ac:chgData name="Thiago Henrique Gomes Panini" userId="cc6a5c77081c362d" providerId="LiveId" clId="{EED3D3E7-5518-44F8-8186-31A285105760}" dt="2023-02-03T21:40:42.200" v="792"/>
+          <ac:spMkLst>
+            <pc:docMk/>
+            <pc:sldMk cId="2654742094" sldId="269"/>
+            <ac:spMk id="91" creationId="{855ECCC0-5FF2-3427-0519-58F167770C45}"/>
+          </ac:spMkLst>
+        </pc:spChg>
+        <pc:spChg chg="add mod">
+          <ac:chgData name="Thiago Henrique Gomes Panini" userId="cc6a5c77081c362d" providerId="LiveId" clId="{EED3D3E7-5518-44F8-8186-31A285105760}" dt="2023-02-03T21:49:30.196" v="888" actId="27107"/>
+          <ac:spMkLst>
+            <pc:docMk/>
+            <pc:sldMk cId="2654742094" sldId="269"/>
+            <ac:spMk id="93" creationId="{845C2867-A52F-02B4-2D88-C72520089ADD}"/>
+          </ac:spMkLst>
+        </pc:spChg>
+        <pc:grpChg chg="add del mod">
+          <ac:chgData name="Thiago Henrique Gomes Panini" userId="cc6a5c77081c362d" providerId="LiveId" clId="{EED3D3E7-5518-44F8-8186-31A285105760}" dt="2023-02-03T21:40:46.338" v="797" actId="478"/>
+          <ac:grpSpMkLst>
+            <pc:docMk/>
+            <pc:sldMk cId="2654742094" sldId="269"/>
+            <ac:grpSpMk id="8" creationId="{59A2F530-9CBF-B06E-CC59-69B9C56281A1}"/>
+          </ac:grpSpMkLst>
+        </pc:grpChg>
+        <pc:grpChg chg="mod">
+          <ac:chgData name="Thiago Henrique Gomes Panini" userId="cc6a5c77081c362d" providerId="LiveId" clId="{EED3D3E7-5518-44F8-8186-31A285105760}" dt="2023-02-03T21:40:37.243" v="790" actId="1076"/>
+          <ac:grpSpMkLst>
+            <pc:docMk/>
+            <pc:sldMk cId="2654742094" sldId="269"/>
+            <ac:grpSpMk id="32" creationId="{D7A74DA2-803D-B48B-6686-45605B40CFB8}"/>
+          </ac:grpSpMkLst>
+        </pc:grpChg>
+        <pc:grpChg chg="mod">
+          <ac:chgData name="Thiago Henrique Gomes Panini" userId="cc6a5c77081c362d" providerId="LiveId" clId="{EED3D3E7-5518-44F8-8186-31A285105760}" dt="2023-02-03T21:40:37.243" v="790" actId="1076"/>
+          <ac:grpSpMkLst>
+            <pc:docMk/>
+            <pc:sldMk cId="2654742094" sldId="269"/>
+            <ac:grpSpMk id="33" creationId="{181BB504-29AD-2089-3261-34A779CA6E6A}"/>
+          </ac:grpSpMkLst>
+        </pc:grpChg>
+        <pc:grpChg chg="add del mod">
+          <ac:chgData name="Thiago Henrique Gomes Panini" userId="cc6a5c77081c362d" providerId="LiveId" clId="{EED3D3E7-5518-44F8-8186-31A285105760}" dt="2023-02-03T21:40:44.530" v="795"/>
+          <ac:grpSpMkLst>
+            <pc:docMk/>
+            <pc:sldMk cId="2654742094" sldId="269"/>
+            <ac:grpSpMk id="50" creationId="{E5024C9F-E5A0-238A-098A-40256AE171A3}"/>
+          </ac:grpSpMkLst>
+        </pc:grpChg>
+        <pc:grpChg chg="mod">
+          <ac:chgData name="Thiago Henrique Gomes Panini" userId="cc6a5c77081c362d" providerId="LiveId" clId="{EED3D3E7-5518-44F8-8186-31A285105760}" dt="2023-02-03T21:40:42.200" v="792"/>
+          <ac:grpSpMkLst>
+            <pc:docMk/>
+            <pc:sldMk cId="2654742094" sldId="269"/>
+            <ac:grpSpMk id="73" creationId="{811066FC-345A-3BB4-60ED-F87368E61BCD}"/>
+          </ac:grpSpMkLst>
+        </pc:grpChg>
+        <pc:grpChg chg="mod">
+          <ac:chgData name="Thiago Henrique Gomes Panini" userId="cc6a5c77081c362d" providerId="LiveId" clId="{EED3D3E7-5518-44F8-8186-31A285105760}" dt="2023-02-03T21:40:42.200" v="792"/>
+          <ac:grpSpMkLst>
+            <pc:docMk/>
+            <pc:sldMk cId="2654742094" sldId="269"/>
+            <ac:grpSpMk id="74" creationId="{69C14EED-7C56-2714-382F-17F852AC85DB}"/>
+          </ac:grpSpMkLst>
+        </pc:grpChg>
+        <pc:grpChg chg="add mod">
+          <ac:chgData name="Thiago Henrique Gomes Panini" userId="cc6a5c77081c362d" providerId="LiveId" clId="{EED3D3E7-5518-44F8-8186-31A285105760}" dt="2023-02-03T21:42:18.403" v="844" actId="164"/>
+          <ac:grpSpMkLst>
+            <pc:docMk/>
+            <pc:sldMk cId="2654742094" sldId="269"/>
+            <ac:grpSpMk id="94" creationId="{13728D5C-547E-1C92-9ABC-039AEF1DBFCE}"/>
+          </ac:grpSpMkLst>
+        </pc:grpChg>
+        <pc:grpChg chg="del">
+          <ac:chgData name="Thiago Henrique Gomes Panini" userId="cc6a5c77081c362d" providerId="LiveId" clId="{EED3D3E7-5518-44F8-8186-31A285105760}" dt="2023-02-03T21:41:58.820" v="842" actId="478"/>
+          <ac:grpSpMkLst>
+            <pc:docMk/>
+            <pc:sldMk cId="2654742094" sldId="269"/>
+            <ac:grpSpMk id="137" creationId="{38FBAED1-C2CD-E6B2-D9B7-496E44DD9A8A}"/>
+          </ac:grpSpMkLst>
+        </pc:grpChg>
+        <pc:picChg chg="mod modCrop">
+          <ac:chgData name="Thiago Henrique Gomes Panini" userId="cc6a5c77081c362d" providerId="LiveId" clId="{EED3D3E7-5518-44F8-8186-31A285105760}" dt="2023-02-03T21:56:46.363" v="893" actId="18131"/>
+          <ac:picMkLst>
+            <pc:docMk/>
+            <pc:sldMk cId="2654742094" sldId="269"/>
+            <ac:picMk id="2" creationId="{58B29FF3-C52F-448F-CE21-E6A83B41279C}"/>
+          </ac:picMkLst>
+        </pc:picChg>
+        <pc:picChg chg="del mod">
+          <ac:chgData name="Thiago Henrique Gomes Panini" userId="cc6a5c77081c362d" providerId="LiveId" clId="{EED3D3E7-5518-44F8-8186-31A285105760}" dt="2023-02-03T21:40:48.679" v="799" actId="478"/>
+          <ac:picMkLst>
+            <pc:docMk/>
+            <pc:sldMk cId="2654742094" sldId="269"/>
+            <ac:picMk id="4" creationId="{A0F5EB9D-2934-15D3-786E-E68DA9F084B0}"/>
+          </ac:picMkLst>
+        </pc:picChg>
+        <pc:picChg chg="mod">
+          <ac:chgData name="Thiago Henrique Gomes Panini" userId="cc6a5c77081c362d" providerId="LiveId" clId="{EED3D3E7-5518-44F8-8186-31A285105760}" dt="2023-02-03T21:40:37.243" v="790" actId="1076"/>
+          <ac:picMkLst>
+            <pc:docMk/>
+            <pc:sldMk cId="2654742094" sldId="269"/>
+            <ac:picMk id="34" creationId="{22688B25-3585-352E-8AFB-43FCA9941625}"/>
+          </ac:picMkLst>
+        </pc:picChg>
+        <pc:picChg chg="mod">
+          <ac:chgData name="Thiago Henrique Gomes Panini" userId="cc6a5c77081c362d" providerId="LiveId" clId="{EED3D3E7-5518-44F8-8186-31A285105760}" dt="2023-02-03T21:40:42.200" v="792"/>
+          <ac:picMkLst>
+            <pc:docMk/>
+            <pc:sldMk cId="2654742094" sldId="269"/>
+            <ac:picMk id="75" creationId="{048A9E1F-46D6-2771-74ED-B7B98810B1B5}"/>
+          </ac:picMkLst>
+        </pc:picChg>
+        <pc:picChg chg="add mod">
+          <ac:chgData name="Thiago Henrique Gomes Panini" userId="cc6a5c77081c362d" providerId="LiveId" clId="{EED3D3E7-5518-44F8-8186-31A285105760}" dt="2023-02-03T21:42:18.403" v="844" actId="164"/>
+          <ac:picMkLst>
+            <pc:docMk/>
+            <pc:sldMk cId="2654742094" sldId="269"/>
+            <ac:picMk id="92" creationId="{802AE781-29DF-6C75-2BDB-1BA2C6D29A01}"/>
           </ac:picMkLst>
         </pc:picChg>
       </pc:sldChg>
@@ -5269,7 +6014,7 @@
           <a:p>
             <a:fld id="{9CE1FC76-2BA8-403C-87AD-E1CC57B2BABD}" type="datetimeFigureOut">
               <a:rPr lang="en-US" smtClean="0"/>
-              <a:t>2/2/2023</a:t>
+              <a:t>2/3/2023</a:t>
             </a:fld>
             <a:endParaRPr lang="en-US"/>
           </a:p>
@@ -5467,7 +6212,7 @@
           <a:p>
             <a:fld id="{9CE1FC76-2BA8-403C-87AD-E1CC57B2BABD}" type="datetimeFigureOut">
               <a:rPr lang="en-US" smtClean="0"/>
-              <a:t>2/2/2023</a:t>
+              <a:t>2/3/2023</a:t>
             </a:fld>
             <a:endParaRPr lang="en-US"/>
           </a:p>
@@ -5675,7 +6420,7 @@
           <a:p>
             <a:fld id="{9CE1FC76-2BA8-403C-87AD-E1CC57B2BABD}" type="datetimeFigureOut">
               <a:rPr lang="en-US" smtClean="0"/>
-              <a:t>2/2/2023</a:t>
+              <a:t>2/3/2023</a:t>
             </a:fld>
             <a:endParaRPr lang="en-US"/>
           </a:p>
@@ -5873,7 +6618,7 @@
           <a:p>
             <a:fld id="{9CE1FC76-2BA8-403C-87AD-E1CC57B2BABD}" type="datetimeFigureOut">
               <a:rPr lang="en-US" smtClean="0"/>
-              <a:t>2/2/2023</a:t>
+              <a:t>2/3/2023</a:t>
             </a:fld>
             <a:endParaRPr lang="en-US"/>
           </a:p>
@@ -6148,7 +6893,7 @@
           <a:p>
             <a:fld id="{9CE1FC76-2BA8-403C-87AD-E1CC57B2BABD}" type="datetimeFigureOut">
               <a:rPr lang="en-US" smtClean="0"/>
-              <a:t>2/2/2023</a:t>
+              <a:t>2/3/2023</a:t>
             </a:fld>
             <a:endParaRPr lang="en-US"/>
           </a:p>
@@ -6413,7 +7158,7 @@
           <a:p>
             <a:fld id="{9CE1FC76-2BA8-403C-87AD-E1CC57B2BABD}" type="datetimeFigureOut">
               <a:rPr lang="en-US" smtClean="0"/>
-              <a:t>2/2/2023</a:t>
+              <a:t>2/3/2023</a:t>
             </a:fld>
             <a:endParaRPr lang="en-US"/>
           </a:p>
@@ -6825,7 +7570,7 @@
           <a:p>
             <a:fld id="{9CE1FC76-2BA8-403C-87AD-E1CC57B2BABD}" type="datetimeFigureOut">
               <a:rPr lang="en-US" smtClean="0"/>
-              <a:t>2/2/2023</a:t>
+              <a:t>2/3/2023</a:t>
             </a:fld>
             <a:endParaRPr lang="en-US"/>
           </a:p>
@@ -6966,7 +7711,7 @@
           <a:p>
             <a:fld id="{9CE1FC76-2BA8-403C-87AD-E1CC57B2BABD}" type="datetimeFigureOut">
               <a:rPr lang="en-US" smtClean="0"/>
-              <a:t>2/2/2023</a:t>
+              <a:t>2/3/2023</a:t>
             </a:fld>
             <a:endParaRPr lang="en-US"/>
           </a:p>
@@ -7079,7 +7824,7 @@
           <a:p>
             <a:fld id="{9CE1FC76-2BA8-403C-87AD-E1CC57B2BABD}" type="datetimeFigureOut">
               <a:rPr lang="en-US" smtClean="0"/>
-              <a:t>2/2/2023</a:t>
+              <a:t>2/3/2023</a:t>
             </a:fld>
             <a:endParaRPr lang="en-US"/>
           </a:p>
@@ -7390,7 +8135,7 @@
           <a:p>
             <a:fld id="{9CE1FC76-2BA8-403C-87AD-E1CC57B2BABD}" type="datetimeFigureOut">
               <a:rPr lang="en-US" smtClean="0"/>
-              <a:t>2/2/2023</a:t>
+              <a:t>2/3/2023</a:t>
             </a:fld>
             <a:endParaRPr lang="en-US"/>
           </a:p>
@@ -7678,7 +8423,7 @@
           <a:p>
             <a:fld id="{9CE1FC76-2BA8-403C-87AD-E1CC57B2BABD}" type="datetimeFigureOut">
               <a:rPr lang="en-US" smtClean="0"/>
-              <a:t>2/2/2023</a:t>
+              <a:t>2/3/2023</a:t>
             </a:fld>
             <a:endParaRPr lang="en-US"/>
           </a:p>
@@ -7919,7 +8664,7 @@
           <a:p>
             <a:fld id="{9CE1FC76-2BA8-403C-87AD-E1CC57B2BABD}" type="datetimeFigureOut">
               <a:rPr lang="en-US" smtClean="0"/>
-              <a:t>2/2/2023</a:t>
+              <a:t>2/3/2023</a:t>
             </a:fld>
             <a:endParaRPr lang="en-US"/>
           </a:p>
@@ -25946,6 +26691,227 @@
           <a:chExt cx="0" cy="0"/>
         </a:xfrm>
       </p:grpSpPr>
+      <p:grpSp>
+        <p:nvGrpSpPr>
+          <p:cNvPr id="94" name="Group 93">
+            <a:extLst>
+              <a:ext uri="{FF2B5EF4-FFF2-40B4-BE49-F238E27FC236}">
+                <a16:creationId xmlns:a16="http://schemas.microsoft.com/office/drawing/2014/main" id="{13728D5C-547E-1C92-9ABC-039AEF1DBFCE}"/>
+              </a:ext>
+            </a:extLst>
+          </p:cNvPr>
+          <p:cNvGrpSpPr/>
+          <p:nvPr/>
+        </p:nvGrpSpPr>
+        <p:grpSpPr>
+          <a:xfrm>
+            <a:off x="0" y="235597"/>
+            <a:ext cx="12192000" cy="2895600"/>
+            <a:chOff x="0" y="235597"/>
+            <a:chExt cx="12192000" cy="2895600"/>
+          </a:xfrm>
+        </p:grpSpPr>
+        <p:pic>
+          <p:nvPicPr>
+            <p:cNvPr id="2" name="Picture 1" descr="A picture containing nature, water, night sky, outdoor&#10;&#10;Description automatically generated">
+              <a:extLst>
+                <a:ext uri="{FF2B5EF4-FFF2-40B4-BE49-F238E27FC236}">
+                  <a16:creationId xmlns:a16="http://schemas.microsoft.com/office/drawing/2014/main" id="{58B29FF3-C52F-448F-CE21-E6A83B41279C}"/>
+                </a:ext>
+              </a:extLst>
+            </p:cNvPr>
+            <p:cNvPicPr>
+              <a:picLocks noChangeAspect="1"/>
+            </p:cNvPicPr>
+            <p:nvPr/>
+          </p:nvPicPr>
+          <p:blipFill rotWithShape="1">
+            <a:blip r:embed="rId2">
+              <a:extLst>
+                <a:ext uri="{28A0092B-C50C-407E-A947-70E740481C1C}">
+                  <a14:useLocalDpi xmlns:a14="http://schemas.microsoft.com/office/drawing/2010/main" val="0"/>
+                </a:ext>
+              </a:extLst>
+            </a:blip>
+            <a:srcRect t="49608" b="35381"/>
+            <a:stretch/>
+          </p:blipFill>
+          <p:spPr>
+            <a:xfrm>
+              <a:off x="0" y="235597"/>
+              <a:ext cx="12192000" cy="2895600"/>
+            </a:xfrm>
+            <a:prstGeom prst="rect">
+              <a:avLst/>
+            </a:prstGeom>
+          </p:spPr>
+        </p:pic>
+        <p:sp>
+          <p:nvSpPr>
+            <p:cNvPr id="5" name="Rectangle 4">
+              <a:extLst>
+                <a:ext uri="{FF2B5EF4-FFF2-40B4-BE49-F238E27FC236}">
+                  <a16:creationId xmlns:a16="http://schemas.microsoft.com/office/drawing/2014/main" id="{C6A01FD5-84E5-2381-286B-F32C449D0633}"/>
+                </a:ext>
+              </a:extLst>
+            </p:cNvPr>
+            <p:cNvSpPr/>
+            <p:nvPr/>
+          </p:nvSpPr>
+          <p:spPr>
+            <a:xfrm>
+              <a:off x="0" y="235597"/>
+              <a:ext cx="12192000" cy="2895600"/>
+            </a:xfrm>
+            <a:prstGeom prst="rect">
+              <a:avLst/>
+            </a:prstGeom>
+            <a:solidFill>
+              <a:srgbClr val="10002B">
+                <a:alpha val="68000"/>
+              </a:srgbClr>
+            </a:solidFill>
+            <a:ln>
+              <a:noFill/>
+            </a:ln>
+          </p:spPr>
+          <p:style>
+            <a:lnRef idx="2">
+              <a:schemeClr val="accent1">
+                <a:shade val="50000"/>
+              </a:schemeClr>
+            </a:lnRef>
+            <a:fillRef idx="1">
+              <a:schemeClr val="accent1"/>
+            </a:fillRef>
+            <a:effectRef idx="0">
+              <a:schemeClr val="accent1"/>
+            </a:effectRef>
+            <a:fontRef idx="minor">
+              <a:schemeClr val="lt1"/>
+            </a:fontRef>
+          </p:style>
+          <p:txBody>
+            <a:bodyPr rtlCol="0" anchor="ctr"/>
+            <a:lstStyle/>
+            <a:p>
+              <a:pPr algn="ctr"/>
+              <a:endParaRPr lang="en-US" dirty="0"/>
+            </a:p>
+          </p:txBody>
+        </p:sp>
+        <p:pic>
+          <p:nvPicPr>
+            <p:cNvPr id="92" name="Picture 91">
+              <a:extLst>
+                <a:ext uri="{FF2B5EF4-FFF2-40B4-BE49-F238E27FC236}">
+                  <a16:creationId xmlns:a16="http://schemas.microsoft.com/office/drawing/2014/main" id="{802AE781-29DF-6C75-2BDB-1BA2C6D29A01}"/>
+                </a:ext>
+              </a:extLst>
+            </p:cNvPr>
+            <p:cNvPicPr>
+              <a:picLocks noChangeAspect="1"/>
+            </p:cNvPicPr>
+            <p:nvPr/>
+          </p:nvPicPr>
+          <p:blipFill>
+            <a:blip r:embed="rId3"/>
+            <a:stretch>
+              <a:fillRect/>
+            </a:stretch>
+          </p:blipFill>
+          <p:spPr>
+            <a:xfrm>
+              <a:off x="5121679" y="457895"/>
+              <a:ext cx="1948642" cy="2295728"/>
+            </a:xfrm>
+            <a:prstGeom prst="rect">
+              <a:avLst/>
+            </a:prstGeom>
+          </p:spPr>
+        </p:pic>
+        <p:sp>
+          <p:nvSpPr>
+            <p:cNvPr id="93" name="TextBox 92">
+              <a:extLst>
+                <a:ext uri="{FF2B5EF4-FFF2-40B4-BE49-F238E27FC236}">
+                  <a16:creationId xmlns:a16="http://schemas.microsoft.com/office/drawing/2014/main" id="{845C2867-A52F-02B4-2D88-C72520089ADD}"/>
+                </a:ext>
+              </a:extLst>
+            </p:cNvPr>
+            <p:cNvSpPr txBox="1"/>
+            <p:nvPr/>
+          </p:nvSpPr>
+          <p:spPr>
+            <a:xfrm>
+              <a:off x="4045789" y="2584346"/>
+              <a:ext cx="4192437" cy="338554"/>
+            </a:xfrm>
+            <a:prstGeom prst="rect">
+              <a:avLst/>
+            </a:prstGeom>
+            <a:noFill/>
+          </p:spPr>
+          <p:txBody>
+            <a:bodyPr wrap="square" rtlCol="0">
+              <a:spAutoFit/>
+            </a:bodyPr>
+            <a:lstStyle/>
+            <a:p>
+              <a:pPr algn="ctr"/>
+              <a:r>
+                <a:rPr lang="pt-BR" sz="1600" i="1" dirty="0">
+                  <a:solidFill>
+                    <a:schemeClr val="bg1"/>
+                  </a:solidFill>
+                  <a:latin typeface="Segoe UI Light" panose="020B0502040204020203" pitchFamily="34" charset="0"/>
+                  <a:ea typeface="Segoe UI Black" panose="020B0A02040204020203" pitchFamily="34" charset="0"/>
+                  <a:cs typeface="Segoe UI Light" panose="020B0502040204020203" pitchFamily="34" charset="0"/>
+                </a:rPr>
+                <a:t>Implantando e conhecendo a infraestrutura</a:t>
+              </a:r>
+              <a:endParaRPr lang="en-US" sz="1600" i="1" dirty="0">
+                <a:solidFill>
+                  <a:schemeClr val="bg1"/>
+                </a:solidFill>
+                <a:latin typeface="Segoe UI Light" panose="020B0502040204020203" pitchFamily="34" charset="0"/>
+                <a:ea typeface="Segoe UI Black" panose="020B0A02040204020203" pitchFamily="34" charset="0"/>
+                <a:cs typeface="Segoe UI Light" panose="020B0502040204020203" pitchFamily="34" charset="0"/>
+              </a:endParaRPr>
+            </a:p>
+          </p:txBody>
+        </p:sp>
+      </p:grpSp>
+    </p:spTree>
+    <p:extLst>
+      <p:ext uri="{BB962C8B-B14F-4D97-AF65-F5344CB8AC3E}">
+        <p14:creationId xmlns:p14="http://schemas.microsoft.com/office/powerpoint/2010/main" val="2654742094"/>
+      </p:ext>
+    </p:extLst>
+  </p:cSld>
+  <p:clrMapOvr>
+    <a:masterClrMapping/>
+  </p:clrMapOvr>
+</p:sld>
+</file>
+
+<file path=ppt/slides/slide7.xml><?xml version="1.0" encoding="utf-8"?>
+<p:sld xmlns:a="http://schemas.openxmlformats.org/drawingml/2006/main" xmlns:r="http://schemas.openxmlformats.org/officeDocument/2006/relationships" xmlns:p="http://schemas.openxmlformats.org/presentationml/2006/main">
+  <p:cSld>
+    <p:spTree>
+      <p:nvGrpSpPr>
+        <p:cNvPr id="1" name=""/>
+        <p:cNvGrpSpPr/>
+        <p:nvPr/>
+      </p:nvGrpSpPr>
+      <p:grpSpPr>
+        <a:xfrm>
+          <a:off x="0" y="0"/>
+          <a:ext cx="0" cy="0"/>
+          <a:chOff x="0" y="0"/>
+          <a:chExt cx="0" cy="0"/>
+        </a:xfrm>
+      </p:grpSpPr>
       <p:pic>
         <p:nvPicPr>
           <p:cNvPr id="3" name="Picture 2" descr="A picture containing nature, night sky&#10;&#10;Description automatically generated">
@@ -26089,7 +27055,7 @@
 </p:sld>
 </file>
 
-<file path=ppt/slides/slide7.xml><?xml version="1.0" encoding="utf-8"?>
+<file path=ppt/slides/slide8.xml><?xml version="1.0" encoding="utf-8"?>
 <p:sld xmlns:a="http://schemas.openxmlformats.org/drawingml/2006/main" xmlns:r="http://schemas.openxmlformats.org/officeDocument/2006/relationships" xmlns:p="http://schemas.openxmlformats.org/presentationml/2006/main">
   <p:cSld>
     <p:spTree>

</xml_diff>